<commit_message>
Compute shader example that went down in flames - uniform image1D not giving a uniform location, and I'm not sure why...
</commit_message>
<xml_diff>
--- a/6023_Gems/D2D/W10_Compute (GPGPU)/GPGPU (OpenGL Compute) part 1.pptx
+++ b/6023_Gems/D2D/W10_Compute (GPGPU)/GPGPU (OpenGL Compute) part 1.pptx
@@ -16,9 +16,16 @@
     <p:sldId id="269" r:id="rId10"/>
     <p:sldId id="270" r:id="rId11"/>
     <p:sldId id="271" r:id="rId12"/>
-    <p:sldId id="272" r:id="rId13"/>
-    <p:sldId id="273" r:id="rId14"/>
+    <p:sldId id="275" r:id="rId13"/>
+    <p:sldId id="272" r:id="rId14"/>
     <p:sldId id="274" r:id="rId15"/>
+    <p:sldId id="273" r:id="rId16"/>
+    <p:sldId id="276" r:id="rId17"/>
+    <p:sldId id="277" r:id="rId18"/>
+    <p:sldId id="278" r:id="rId19"/>
+    <p:sldId id="279" r:id="rId20"/>
+    <p:sldId id="280" r:id="rId21"/>
+    <p:sldId id="281" r:id="rId22"/>
   </p:sldIdLst>
   <p:sldSz cx="12192000" cy="6858000"/>
   <p:notesSz cx="6858000" cy="9144000"/>
@@ -274,7 +281,7 @@
           <a:p>
             <a:fld id="{6087740A-4270-4284-BAA8-51B30D74E5BB}" type="datetimeFigureOut">
               <a:rPr lang="en-CA" smtClean="0"/>
-              <a:t>2024-03-19</a:t>
+              <a:t>2024-03-21</a:t>
             </a:fld>
             <a:endParaRPr lang="en-CA"/>
           </a:p>
@@ -474,7 +481,7 @@
           <a:p>
             <a:fld id="{6087740A-4270-4284-BAA8-51B30D74E5BB}" type="datetimeFigureOut">
               <a:rPr lang="en-CA" smtClean="0"/>
-              <a:t>2024-03-19</a:t>
+              <a:t>2024-03-21</a:t>
             </a:fld>
             <a:endParaRPr lang="en-CA"/>
           </a:p>
@@ -684,7 +691,7 @@
           <a:p>
             <a:fld id="{6087740A-4270-4284-BAA8-51B30D74E5BB}" type="datetimeFigureOut">
               <a:rPr lang="en-CA" smtClean="0"/>
-              <a:t>2024-03-19</a:t>
+              <a:t>2024-03-21</a:t>
             </a:fld>
             <a:endParaRPr lang="en-CA"/>
           </a:p>
@@ -884,7 +891,7 @@
           <a:p>
             <a:fld id="{6087740A-4270-4284-BAA8-51B30D74E5BB}" type="datetimeFigureOut">
               <a:rPr lang="en-CA" smtClean="0"/>
-              <a:t>2024-03-19</a:t>
+              <a:t>2024-03-21</a:t>
             </a:fld>
             <a:endParaRPr lang="en-CA"/>
           </a:p>
@@ -1160,7 +1167,7 @@
           <a:p>
             <a:fld id="{6087740A-4270-4284-BAA8-51B30D74E5BB}" type="datetimeFigureOut">
               <a:rPr lang="en-CA" smtClean="0"/>
-              <a:t>2024-03-19</a:t>
+              <a:t>2024-03-21</a:t>
             </a:fld>
             <a:endParaRPr lang="en-CA"/>
           </a:p>
@@ -1428,7 +1435,7 @@
           <a:p>
             <a:fld id="{6087740A-4270-4284-BAA8-51B30D74E5BB}" type="datetimeFigureOut">
               <a:rPr lang="en-CA" smtClean="0"/>
-              <a:t>2024-03-19</a:t>
+              <a:t>2024-03-21</a:t>
             </a:fld>
             <a:endParaRPr lang="en-CA"/>
           </a:p>
@@ -1843,7 +1850,7 @@
           <a:p>
             <a:fld id="{6087740A-4270-4284-BAA8-51B30D74E5BB}" type="datetimeFigureOut">
               <a:rPr lang="en-CA" smtClean="0"/>
-              <a:t>2024-03-19</a:t>
+              <a:t>2024-03-21</a:t>
             </a:fld>
             <a:endParaRPr lang="en-CA"/>
           </a:p>
@@ -1985,7 +1992,7 @@
           <a:p>
             <a:fld id="{6087740A-4270-4284-BAA8-51B30D74E5BB}" type="datetimeFigureOut">
               <a:rPr lang="en-CA" smtClean="0"/>
-              <a:t>2024-03-19</a:t>
+              <a:t>2024-03-21</a:t>
             </a:fld>
             <a:endParaRPr lang="en-CA"/>
           </a:p>
@@ -2098,7 +2105,7 @@
           <a:p>
             <a:fld id="{6087740A-4270-4284-BAA8-51B30D74E5BB}" type="datetimeFigureOut">
               <a:rPr lang="en-CA" smtClean="0"/>
-              <a:t>2024-03-19</a:t>
+              <a:t>2024-03-21</a:t>
             </a:fld>
             <a:endParaRPr lang="en-CA"/>
           </a:p>
@@ -2411,7 +2418,7 @@
           <a:p>
             <a:fld id="{6087740A-4270-4284-BAA8-51B30D74E5BB}" type="datetimeFigureOut">
               <a:rPr lang="en-CA" smtClean="0"/>
-              <a:t>2024-03-19</a:t>
+              <a:t>2024-03-21</a:t>
             </a:fld>
             <a:endParaRPr lang="en-CA"/>
           </a:p>
@@ -2700,7 +2707,7 @@
           <a:p>
             <a:fld id="{6087740A-4270-4284-BAA8-51B30D74E5BB}" type="datetimeFigureOut">
               <a:rPr lang="en-CA" smtClean="0"/>
-              <a:t>2024-03-19</a:t>
+              <a:t>2024-03-21</a:t>
             </a:fld>
             <a:endParaRPr lang="en-CA"/>
           </a:p>
@@ -2943,7 +2950,7 @@
           <a:p>
             <a:fld id="{6087740A-4270-4284-BAA8-51B30D74E5BB}" type="datetimeFigureOut">
               <a:rPr lang="en-CA" smtClean="0"/>
-              <a:t>2024-03-19</a:t>
+              <a:t>2024-03-21</a:t>
             </a:fld>
             <a:endParaRPr lang="en-CA"/>
           </a:p>
@@ -3569,7 +3576,7 @@
         </p:spPr>
         <p:txBody>
           <a:bodyPr>
-            <a:normAutofit fontScale="92500"/>
+            <a:normAutofit fontScale="92500" lnSpcReduction="10000"/>
           </a:bodyPr>
           <a:lstStyle/>
           <a:p>
@@ -3678,6 +3685,11 @@
               </a:rPr>
               <a:t>);</a:t>
             </a:r>
+          </a:p>
+          <a:p>
+            <a:endParaRPr lang="en-CA" dirty="0">
+              <a:sym typeface="Wingdings" panose="05000000000000000000" pitchFamily="2" charset="2"/>
+            </a:endParaRPr>
           </a:p>
           <a:p>
             <a:endParaRPr lang="en-CA" dirty="0">
@@ -5753,7 +5765,7 @@
           <a:p>
             <a:r>
               <a:rPr lang="en-CA" dirty="0"/>
-              <a:t>Workgroups &amp; invocation IDs</a:t>
+              <a:t>Limits on workgroups</a:t>
             </a:r>
           </a:p>
         </p:txBody>
@@ -5776,13 +5788,13 @@
         </p:nvSpPr>
         <p:spPr>
           <a:xfrm>
-            <a:off x="765048" y="1253330"/>
-            <a:ext cx="10515600" cy="5138325"/>
+            <a:off x="206477" y="1253330"/>
+            <a:ext cx="11670891" cy="5138325"/>
           </a:xfrm>
         </p:spPr>
         <p:txBody>
           <a:bodyPr>
-            <a:normAutofit/>
+            <a:normAutofit fontScale="77500" lnSpcReduction="20000"/>
           </a:bodyPr>
           <a:lstStyle/>
           <a:p>
@@ -5920,56 +5932,195 @@
           </a:p>
           <a:p>
             <a:r>
-              <a:rPr lang="en-CA" dirty="0">
+              <a:rPr lang="en-CA" sz="2600" dirty="0">
                 <a:sym typeface="Wingdings" panose="05000000000000000000" pitchFamily="2" charset="2"/>
               </a:rPr>
-              <a:t>So the number of groups is really just to help you manage what it is that you are trying to do, rather than some visualization or requirement of the 3D space or something. </a:t>
-            </a:r>
-          </a:p>
-          <a:p>
-            <a:r>
-              <a:rPr lang="en-CA" dirty="0">
+              <a:t>You can’t call any value on Dispatch, like you can’t call: </a:t>
+            </a:r>
+            <a:r>
+              <a:rPr lang="en-CA" sz="2600" dirty="0" err="1">
                 <a:sym typeface="Wingdings" panose="05000000000000000000" pitchFamily="2" charset="2"/>
               </a:rPr>
-              <a:t>Like you can completely ignore all those built in variables if you want, or you can perform your own calculations internally:</a:t>
+              <a:t>glDispatchCompute</a:t>
+            </a:r>
+            <a:r>
+              <a:rPr lang="en-CA" sz="2600" dirty="0">
+                <a:sym typeface="Wingdings" panose="05000000000000000000" pitchFamily="2" charset="2"/>
+              </a:rPr>
+              <a:t>( 1,000,000,000, 1, 1 )</a:t>
+            </a:r>
+          </a:p>
+          <a:p>
+            <a:r>
+              <a:rPr lang="en-US" dirty="0">
+                <a:sym typeface="Wingdings" panose="05000000000000000000" pitchFamily="2" charset="2"/>
+              </a:rPr>
+              <a:t>GL_MAX_COMPUTE_WORK_GROUP_INVOCATIONS: </a:t>
             </a:r>
           </a:p>
           <a:p>
             <a:pPr lvl="1"/>
             <a:r>
-              <a:rPr lang="en-CA" dirty="0">
+              <a:rPr lang="en-US" dirty="0">
                 <a:sym typeface="Wingdings" panose="05000000000000000000" pitchFamily="2" charset="2"/>
               </a:rPr>
-              <a:t>If it was a 2D image, you can still pass a 1D index</a:t>
+              <a:t>data returns </a:t>
+            </a:r>
+            <a:r>
+              <a:rPr lang="en-US" b="1" dirty="0">
+                <a:sym typeface="Wingdings" panose="05000000000000000000" pitchFamily="2" charset="2"/>
+              </a:rPr>
+              <a:t>one</a:t>
+            </a:r>
+            <a:r>
+              <a:rPr lang="en-US" dirty="0">
+                <a:sym typeface="Wingdings" panose="05000000000000000000" pitchFamily="2" charset="2"/>
+              </a:rPr>
+              <a:t> value, the number of invocations in a single local work group (i.e., the product of the three dimensions) that may be dispatched to a compute shader. </a:t>
+            </a:r>
+          </a:p>
+          <a:p>
+            <a:r>
+              <a:rPr lang="en-US" dirty="0">
+                <a:sym typeface="Wingdings" panose="05000000000000000000" pitchFamily="2" charset="2"/>
+              </a:rPr>
+              <a:t>GL_MAX_COMPUTE_WORK_GROUP_COUNT: </a:t>
             </a:r>
           </a:p>
           <a:p>
             <a:pPr lvl="1"/>
             <a:r>
-              <a:rPr lang="en-CA" dirty="0">
+              <a:rPr lang="en-US" dirty="0">
                 <a:sym typeface="Wingdings" panose="05000000000000000000" pitchFamily="2" charset="2"/>
               </a:rPr>
-              <a:t>You could pass a 3D grid of, say AABB information as a 1D value that represents the total size of the 3D (as a 1D array: which </a:t>
-            </a:r>
-            <a:r>
-              <a:rPr lang="en-CA" i="1" dirty="0">
+              <a:t>Accepted by the indexed versions of </a:t>
+            </a:r>
+            <a:r>
+              <a:rPr lang="en-US" dirty="0" err="1">
                 <a:sym typeface="Wingdings" panose="05000000000000000000" pitchFamily="2" charset="2"/>
               </a:rPr>
-              <a:t>all </a:t>
-            </a:r>
-            <a:r>
-              <a:rPr lang="en-CA" dirty="0">
+              <a:t>glGet</a:t>
+            </a:r>
+            <a:r>
+              <a:rPr lang="en-US" dirty="0">
                 <a:sym typeface="Wingdings" panose="05000000000000000000" pitchFamily="2" charset="2"/>
               </a:rPr>
-              <a:t>3D arrays really are – the computers memory is a giant 1D array, after all…)</a:t>
-            </a:r>
+              <a:t>. data the maximum number of work groups that may be dispatched to a compute shader. Indices 0, 1, and 2 correspond to the X, Y and Z dimensions, respectively. </a:t>
+            </a:r>
+          </a:p>
+          <a:p>
+            <a:pPr lvl="1"/>
+            <a:r>
+              <a:rPr lang="en-US" dirty="0">
+                <a:sym typeface="Wingdings" panose="05000000000000000000" pitchFamily="2" charset="2"/>
+              </a:rPr>
+              <a:t>Note: You call </a:t>
+            </a:r>
+            <a:r>
+              <a:rPr lang="en-US" dirty="0" err="1">
+                <a:sym typeface="Wingdings" panose="05000000000000000000" pitchFamily="2" charset="2"/>
+              </a:rPr>
+              <a:t>glGetIntegeri_v</a:t>
+            </a:r>
+            <a:r>
+              <a:rPr lang="en-US" dirty="0">
+                <a:sym typeface="Wingdings" panose="05000000000000000000" pitchFamily="2" charset="2"/>
+              </a:rPr>
+              <a:t>() passing an array of 3 integers</a:t>
+            </a:r>
+          </a:p>
+          <a:p>
+            <a:pPr lvl="2"/>
+            <a:r>
+              <a:rPr lang="en-US" sz="2600" dirty="0" err="1">
+                <a:sym typeface="Wingdings" panose="05000000000000000000" pitchFamily="2" charset="2"/>
+              </a:rPr>
+              <a:t>GLint</a:t>
+            </a:r>
+            <a:r>
+              <a:rPr lang="en-US" sz="2600" dirty="0">
+                <a:sym typeface="Wingdings" panose="05000000000000000000" pitchFamily="2" charset="2"/>
+              </a:rPr>
+              <a:t> </a:t>
+            </a:r>
+            <a:r>
+              <a:rPr lang="en-US" sz="2600" dirty="0" err="1">
+                <a:sym typeface="Wingdings" panose="05000000000000000000" pitchFamily="2" charset="2"/>
+              </a:rPr>
+              <a:t>maxComputeWorkGroupCount</a:t>
+            </a:r>
+            <a:r>
+              <a:rPr lang="en-US" sz="2600" dirty="0">
+                <a:sym typeface="Wingdings" panose="05000000000000000000" pitchFamily="2" charset="2"/>
+              </a:rPr>
+              <a:t>[3] = {0};</a:t>
+            </a:r>
+          </a:p>
+          <a:p>
+            <a:pPr lvl="2"/>
+            <a:r>
+              <a:rPr lang="en-US" sz="2600" dirty="0" err="1">
+                <a:sym typeface="Wingdings" panose="05000000000000000000" pitchFamily="2" charset="2"/>
+              </a:rPr>
+              <a:t>glGetIntegeri_v</a:t>
+            </a:r>
+            <a:r>
+              <a:rPr lang="en-US" sz="2600" dirty="0">
+                <a:sym typeface="Wingdings" panose="05000000000000000000" pitchFamily="2" charset="2"/>
+              </a:rPr>
+              <a:t>(GL_MAX_COMPUTE_WORK_GROUP_COUNT, </a:t>
+            </a:r>
+            <a:r>
+              <a:rPr lang="en-US" sz="2600" dirty="0" err="1">
+                <a:sym typeface="Wingdings" panose="05000000000000000000" pitchFamily="2" charset="2"/>
+              </a:rPr>
+              <a:t>maxComputeWorkGroupCount</a:t>
+            </a:r>
+            <a:r>
+              <a:rPr lang="en-US" sz="2600" dirty="0">
+                <a:sym typeface="Wingdings" panose="05000000000000000000" pitchFamily="2" charset="2"/>
+              </a:rPr>
+              <a:t>)</a:t>
+            </a:r>
+          </a:p>
+          <a:p>
+            <a:r>
+              <a:rPr lang="en-US" dirty="0">
+                <a:sym typeface="Wingdings" panose="05000000000000000000" pitchFamily="2" charset="2"/>
+              </a:rPr>
+              <a:t>GL_MAX_COMPUTE_WORK_GROUP_SIZE:</a:t>
+            </a:r>
+          </a:p>
+          <a:p>
+            <a:pPr lvl="1"/>
+            <a:r>
+              <a:rPr lang="en-US" dirty="0">
+                <a:sym typeface="Wingdings" panose="05000000000000000000" pitchFamily="2" charset="2"/>
+              </a:rPr>
+              <a:t>Accepted by the indexed versions of </a:t>
+            </a:r>
+            <a:r>
+              <a:rPr lang="en-US" dirty="0" err="1">
+                <a:sym typeface="Wingdings" panose="05000000000000000000" pitchFamily="2" charset="2"/>
+              </a:rPr>
+              <a:t>glGet</a:t>
+            </a:r>
+            <a:r>
+              <a:rPr lang="en-US" dirty="0">
+                <a:sym typeface="Wingdings" panose="05000000000000000000" pitchFamily="2" charset="2"/>
+              </a:rPr>
+              <a:t>. data the maximum size of a work groups that may be used during compilation of a compute shader. Indices 0, 1, and 2 correspond to the X, Y and Z dimensions, respectively.</a:t>
+            </a:r>
+            <a:endParaRPr lang="en-CA" dirty="0">
+              <a:sym typeface="Wingdings" panose="05000000000000000000" pitchFamily="2" charset="2"/>
+            </a:endParaRPr>
           </a:p>
         </p:txBody>
       </p:sp>
     </p:spTree>
     <p:extLst>
       <p:ext uri="{BB962C8B-B14F-4D97-AF65-F5344CB8AC3E}">
-        <p14:creationId xmlns:p14="http://schemas.microsoft.com/office/powerpoint/2010/main" val="1063412888"/>
+        <p14:creationId xmlns:p14="http://schemas.microsoft.com/office/powerpoint/2010/main" val="1628495831"/>
       </p:ext>
     </p:extLst>
   </p:cSld>
@@ -6024,7 +6175,7 @@
           <a:p>
             <a:r>
               <a:rPr lang="en-CA" dirty="0"/>
-              <a:t>Synchronizations and barriers</a:t>
+              <a:t>Workgroups &amp; invocation IDs</a:t>
             </a:r>
           </a:p>
         </p:txBody>
@@ -6059,18 +6210,142 @@
           <a:p>
             <a:r>
               <a:rPr lang="en-CA" dirty="0">
-                <a:sym typeface="Wingdings" panose="05000000000000000000" pitchFamily="2" charset="2"/>
-              </a:rPr>
-              <a:t>There are ways to synchronize compute instances.</a:t>
-            </a:r>
-          </a:p>
-          <a:p>
-            <a:pPr lvl="1"/>
+                <a:latin typeface="Courier New" panose="02070309020205020404" pitchFamily="49" charset="0"/>
+                <a:cs typeface="Courier New" panose="02070309020205020404" pitchFamily="49" charset="0"/>
+              </a:rPr>
+              <a:t>void </a:t>
+            </a:r>
+            <a:r>
+              <a:rPr lang="en-CA" dirty="0" err="1">
+                <a:latin typeface="Courier New" panose="02070309020205020404" pitchFamily="49" charset="0"/>
+                <a:cs typeface="Courier New" panose="02070309020205020404" pitchFamily="49" charset="0"/>
+              </a:rPr>
+              <a:t>glDispatchCompute</a:t>
+            </a:r>
+            <a:r>
+              <a:rPr lang="en-CA" dirty="0">
+                <a:latin typeface="Courier New" panose="02070309020205020404" pitchFamily="49" charset="0"/>
+                <a:cs typeface="Courier New" panose="02070309020205020404" pitchFamily="49" charset="0"/>
+              </a:rPr>
+              <a:t>( </a:t>
+            </a:r>
+            <a:r>
+              <a:rPr lang="en-CA" dirty="0" err="1">
+                <a:latin typeface="Courier New" panose="02070309020205020404" pitchFamily="49" charset="0"/>
+                <a:cs typeface="Courier New" panose="02070309020205020404" pitchFamily="49" charset="0"/>
+              </a:rPr>
+              <a:t>GLuint</a:t>
+            </a:r>
+            <a:r>
+              <a:rPr lang="en-CA" dirty="0">
+                <a:latin typeface="Courier New" panose="02070309020205020404" pitchFamily="49" charset="0"/>
+                <a:cs typeface="Courier New" panose="02070309020205020404" pitchFamily="49" charset="0"/>
+              </a:rPr>
+              <a:t> </a:t>
+            </a:r>
+            <a:r>
+              <a:rPr lang="en-CA" dirty="0" err="1">
+                <a:latin typeface="Courier New" panose="02070309020205020404" pitchFamily="49" charset="0"/>
+                <a:cs typeface="Courier New" panose="02070309020205020404" pitchFamily="49" charset="0"/>
+              </a:rPr>
+              <a:t>num_groups_x</a:t>
+            </a:r>
+            <a:r>
+              <a:rPr lang="en-CA" dirty="0">
+                <a:latin typeface="Courier New" panose="02070309020205020404" pitchFamily="49" charset="0"/>
+                <a:cs typeface="Courier New" panose="02070309020205020404" pitchFamily="49" charset="0"/>
+              </a:rPr>
+              <a:t>,</a:t>
+            </a:r>
+            <a:br>
+              <a:rPr lang="en-CA" dirty="0">
+                <a:latin typeface="Courier New" panose="02070309020205020404" pitchFamily="49" charset="0"/>
+                <a:cs typeface="Courier New" panose="02070309020205020404" pitchFamily="49" charset="0"/>
+              </a:rPr>
+            </a:br>
+            <a:r>
+              <a:rPr lang="en-CA" dirty="0">
+                <a:latin typeface="Courier New" panose="02070309020205020404" pitchFamily="49" charset="0"/>
+                <a:cs typeface="Courier New" panose="02070309020205020404" pitchFamily="49" charset="0"/>
+              </a:rPr>
+              <a:t>                        </a:t>
+            </a:r>
+            <a:r>
+              <a:rPr lang="en-CA" dirty="0" err="1">
+                <a:latin typeface="Courier New" panose="02070309020205020404" pitchFamily="49" charset="0"/>
+                <a:cs typeface="Courier New" panose="02070309020205020404" pitchFamily="49" charset="0"/>
+              </a:rPr>
+              <a:t>GLuint</a:t>
+            </a:r>
+            <a:r>
+              <a:rPr lang="en-CA" dirty="0">
+                <a:latin typeface="Courier New" panose="02070309020205020404" pitchFamily="49" charset="0"/>
+                <a:cs typeface="Courier New" panose="02070309020205020404" pitchFamily="49" charset="0"/>
+              </a:rPr>
+              <a:t> </a:t>
+            </a:r>
+            <a:r>
+              <a:rPr lang="en-CA" dirty="0" err="1">
+                <a:latin typeface="Courier New" panose="02070309020205020404" pitchFamily="49" charset="0"/>
+                <a:cs typeface="Courier New" panose="02070309020205020404" pitchFamily="49" charset="0"/>
+              </a:rPr>
+              <a:t>num_groups_y</a:t>
+            </a:r>
+            <a:r>
+              <a:rPr lang="en-CA" dirty="0">
+                <a:latin typeface="Courier New" panose="02070309020205020404" pitchFamily="49" charset="0"/>
+                <a:cs typeface="Courier New" panose="02070309020205020404" pitchFamily="49" charset="0"/>
+              </a:rPr>
+              <a:t>,</a:t>
+            </a:r>
+            <a:br>
+              <a:rPr lang="en-CA" dirty="0">
+                <a:latin typeface="Courier New" panose="02070309020205020404" pitchFamily="49" charset="0"/>
+                <a:cs typeface="Courier New" panose="02070309020205020404" pitchFamily="49" charset="0"/>
+              </a:rPr>
+            </a:br>
+            <a:r>
+              <a:rPr lang="en-CA" dirty="0">
+                <a:latin typeface="Courier New" panose="02070309020205020404" pitchFamily="49" charset="0"/>
+                <a:cs typeface="Courier New" panose="02070309020205020404" pitchFamily="49" charset="0"/>
+              </a:rPr>
+              <a:t>                        </a:t>
+            </a:r>
+            <a:r>
+              <a:rPr lang="en-CA" dirty="0" err="1">
+                <a:latin typeface="Courier New" panose="02070309020205020404" pitchFamily="49" charset="0"/>
+                <a:cs typeface="Courier New" panose="02070309020205020404" pitchFamily="49" charset="0"/>
+              </a:rPr>
+              <a:t>GLuint</a:t>
+            </a:r>
+            <a:r>
+              <a:rPr lang="en-CA" dirty="0">
+                <a:latin typeface="Courier New" panose="02070309020205020404" pitchFamily="49" charset="0"/>
+                <a:cs typeface="Courier New" panose="02070309020205020404" pitchFamily="49" charset="0"/>
+              </a:rPr>
+              <a:t> </a:t>
+            </a:r>
+            <a:r>
+              <a:rPr lang="en-CA" dirty="0" err="1">
+                <a:latin typeface="Courier New" panose="02070309020205020404" pitchFamily="49" charset="0"/>
+                <a:cs typeface="Courier New" panose="02070309020205020404" pitchFamily="49" charset="0"/>
+              </a:rPr>
+              <a:t>num_groups_z</a:t>
+            </a:r>
+            <a:r>
+              <a:rPr lang="en-CA" dirty="0">
+                <a:latin typeface="Courier New" panose="02070309020205020404" pitchFamily="49" charset="0"/>
+                <a:cs typeface="Courier New" panose="02070309020205020404" pitchFamily="49" charset="0"/>
+              </a:rPr>
+              <a:t>);</a:t>
+            </a:r>
+          </a:p>
+          <a:p>
             <a:r>
               <a:rPr lang="en-CA" dirty="0">
                 <a:sym typeface="Wingdings" panose="05000000000000000000" pitchFamily="2" charset="2"/>
               </a:rPr>
-              <a:t>Think “wait for multiple objects” or a critical section lock</a:t>
+              <a:t>So the number of groups is really just to help you manage what it is that you are trying to do, rather than some visualization or requirement of the 3D space or something. </a:t>
             </a:r>
           </a:p>
           <a:p>
@@ -6078,44 +6353,37 @@
               <a:rPr lang="en-CA" dirty="0">
                 <a:sym typeface="Wingdings" panose="05000000000000000000" pitchFamily="2" charset="2"/>
               </a:rPr>
-              <a:t>But that’s usually not what the compute is for.</a:t>
-            </a:r>
-          </a:p>
-          <a:p>
+              <a:t>Like you can completely ignore all those built in variables if you want, or you can perform your own calculations internally:</a:t>
+            </a:r>
+          </a:p>
+          <a:p>
+            <a:pPr lvl="1"/>
             <a:r>
               <a:rPr lang="en-CA" dirty="0">
                 <a:sym typeface="Wingdings" panose="05000000000000000000" pitchFamily="2" charset="2"/>
               </a:rPr>
-              <a:t>A barrier() in GLSL will stop the shader until the other instances reach it, and there are atomic (think interlock-exchange or locks) functions that allow uniforms/buffer data to be read/written by only one instance at a time. </a:t>
-            </a:r>
-          </a:p>
-          <a:p>
+              <a:t>If it was a 2D image, you can still pass a 1D index</a:t>
+            </a:r>
+          </a:p>
+          <a:p>
+            <a:pPr lvl="1"/>
             <a:r>
               <a:rPr lang="en-CA" dirty="0">
                 <a:sym typeface="Wingdings" panose="05000000000000000000" pitchFamily="2" charset="2"/>
               </a:rPr>
-              <a:t>However, you might consider ways to </a:t>
+              <a:t>You could pass a 3D grid of, say AABB information as a 1D value that represents the total size of the 3D (as a 1D array: which </a:t>
             </a:r>
             <a:r>
               <a:rPr lang="en-CA" i="1" dirty="0">
                 <a:sym typeface="Wingdings" panose="05000000000000000000" pitchFamily="2" charset="2"/>
               </a:rPr>
-              <a:t>not </a:t>
+              <a:t>all </a:t>
             </a:r>
             <a:r>
               <a:rPr lang="en-CA" dirty="0">
                 <a:sym typeface="Wingdings" panose="05000000000000000000" pitchFamily="2" charset="2"/>
               </a:rPr>
-              <a:t>do this, just to get your head around just how massive the threading is.</a:t>
-            </a:r>
-          </a:p>
-          <a:p>
-            <a:pPr lvl="1"/>
-            <a:r>
-              <a:rPr lang="en-CA" dirty="0">
-                <a:sym typeface="Wingdings" panose="05000000000000000000" pitchFamily="2" charset="2"/>
-              </a:rPr>
-              <a:t>i.e. think about copying one buffer to another buffer, rather than typical single threaded sort of algorithms/techniques</a:t>
+              <a:t>3D arrays really are – the computers memory is a giant 1D array, after all…)</a:t>
             </a:r>
           </a:p>
         </p:txBody>
@@ -6123,7 +6391,7 @@
     </p:spTree>
     <p:extLst>
       <p:ext uri="{BB962C8B-B14F-4D97-AF65-F5344CB8AC3E}">
-        <p14:creationId xmlns:p14="http://schemas.microsoft.com/office/powerpoint/2010/main" val="4183890911"/>
+        <p14:creationId xmlns:p14="http://schemas.microsoft.com/office/powerpoint/2010/main" val="1063412888"/>
       </p:ext>
     </p:extLst>
   </p:cSld>
@@ -6239,7 +6507,7 @@
               <a:rPr lang="en-CA" dirty="0">
                 <a:sym typeface="Wingdings" panose="05000000000000000000" pitchFamily="2" charset="2"/>
               </a:rPr>
-              <a:t>dispatch way more than one instance of a shader. </a:t>
+              <a:t>dispatch way more than one instance of a shader -&gt; these are called “warps” and “wavefronts” because… that sounds cool.</a:t>
             </a:r>
           </a:p>
           <a:p>
@@ -6295,17 +6563,8 @@
               <a:rPr lang="en-CA" dirty="0">
                 <a:sym typeface="Wingdings" panose="05000000000000000000" pitchFamily="2" charset="2"/>
               </a:rPr>
-              <a:t>So you should consider calling Dispatch </a:t>
-            </a:r>
-            <a:r>
-              <a:rPr lang="en-CA">
-                <a:sym typeface="Wingdings" panose="05000000000000000000" pitchFamily="2" charset="2"/>
-              </a:rPr>
-              <a:t>with multiples of 32</a:t>
-            </a:r>
-            <a:endParaRPr lang="en-CA" dirty="0">
-              <a:sym typeface="Wingdings" panose="05000000000000000000" pitchFamily="2" charset="2"/>
-            </a:endParaRPr>
+              <a:t>So you should consider calling Dispatch with multiples of 64</a:t>
+            </a:r>
           </a:p>
         </p:txBody>
       </p:sp>
@@ -6313,6 +6572,1129 @@
     <p:extLst>
       <p:ext uri="{BB962C8B-B14F-4D97-AF65-F5344CB8AC3E}">
         <p14:creationId xmlns:p14="http://schemas.microsoft.com/office/powerpoint/2010/main" val="1522407079"/>
+      </p:ext>
+    </p:extLst>
+  </p:cSld>
+  <p:clrMapOvr>
+    <a:masterClrMapping/>
+  </p:clrMapOvr>
+</p:sld>
+</file>
+
+<file path=ppt/slides/slide15.xml><?xml version="1.0" encoding="utf-8"?>
+<p:sld xmlns:a="http://schemas.openxmlformats.org/drawingml/2006/main" xmlns:r="http://schemas.openxmlformats.org/officeDocument/2006/relationships" xmlns:p="http://schemas.openxmlformats.org/presentationml/2006/main">
+  <p:cSld>
+    <p:spTree>
+      <p:nvGrpSpPr>
+        <p:cNvPr id="1" name=""/>
+        <p:cNvGrpSpPr/>
+        <p:nvPr/>
+      </p:nvGrpSpPr>
+      <p:grpSpPr>
+        <a:xfrm>
+          <a:off x="0" y="0"/>
+          <a:ext cx="0" cy="0"/>
+          <a:chOff x="0" y="0"/>
+          <a:chExt cx="0" cy="0"/>
+        </a:xfrm>
+      </p:grpSpPr>
+      <p:sp>
+        <p:nvSpPr>
+          <p:cNvPr id="4" name="Title 3">
+            <a:extLst>
+              <a:ext uri="{FF2B5EF4-FFF2-40B4-BE49-F238E27FC236}">
+                <a16:creationId xmlns:a16="http://schemas.microsoft.com/office/drawing/2014/main" id="{1DC5DC1C-3282-D685-938B-FCF2D3B2E094}"/>
+              </a:ext>
+            </a:extLst>
+          </p:cNvPr>
+          <p:cNvSpPr>
+            <a:spLocks noGrp="1"/>
+          </p:cNvSpPr>
+          <p:nvPr>
+            <p:ph type="title"/>
+          </p:nvPr>
+        </p:nvSpPr>
+        <p:spPr>
+          <a:xfrm>
+            <a:off x="838200" y="365125"/>
+            <a:ext cx="10515600" cy="759587"/>
+          </a:xfrm>
+        </p:spPr>
+        <p:txBody>
+          <a:bodyPr/>
+          <a:lstStyle/>
+          <a:p>
+            <a:r>
+              <a:rPr lang="en-CA" dirty="0"/>
+              <a:t>Synchronizations and barriers</a:t>
+            </a:r>
+          </a:p>
+        </p:txBody>
+      </p:sp>
+      <p:sp>
+        <p:nvSpPr>
+          <p:cNvPr id="5" name="Content Placeholder 4">
+            <a:extLst>
+              <a:ext uri="{FF2B5EF4-FFF2-40B4-BE49-F238E27FC236}">
+                <a16:creationId xmlns:a16="http://schemas.microsoft.com/office/drawing/2014/main" id="{76E6BD03-D01C-C411-F3A7-0FA82F6E9FAF}"/>
+              </a:ext>
+            </a:extLst>
+          </p:cNvPr>
+          <p:cNvSpPr>
+            <a:spLocks noGrp="1"/>
+          </p:cNvSpPr>
+          <p:nvPr>
+            <p:ph idx="1"/>
+          </p:nvPr>
+        </p:nvSpPr>
+        <p:spPr>
+          <a:xfrm>
+            <a:off x="765048" y="1253330"/>
+            <a:ext cx="10515600" cy="5138325"/>
+          </a:xfrm>
+        </p:spPr>
+        <p:txBody>
+          <a:bodyPr>
+            <a:normAutofit/>
+          </a:bodyPr>
+          <a:lstStyle/>
+          <a:p>
+            <a:r>
+              <a:rPr lang="en-CA" dirty="0">
+                <a:sym typeface="Wingdings" panose="05000000000000000000" pitchFamily="2" charset="2"/>
+              </a:rPr>
+              <a:t>There are ways to synchronize compute instances.</a:t>
+            </a:r>
+          </a:p>
+          <a:p>
+            <a:pPr lvl="1"/>
+            <a:r>
+              <a:rPr lang="en-CA" dirty="0">
+                <a:sym typeface="Wingdings" panose="05000000000000000000" pitchFamily="2" charset="2"/>
+              </a:rPr>
+              <a:t>Think “wait for multiple objects” or a critical section lock</a:t>
+            </a:r>
+          </a:p>
+          <a:p>
+            <a:r>
+              <a:rPr lang="en-CA" dirty="0">
+                <a:sym typeface="Wingdings" panose="05000000000000000000" pitchFamily="2" charset="2"/>
+              </a:rPr>
+              <a:t>But that’s usually not what the compute is for.</a:t>
+            </a:r>
+          </a:p>
+          <a:p>
+            <a:r>
+              <a:rPr lang="en-CA" dirty="0">
+                <a:sym typeface="Wingdings" panose="05000000000000000000" pitchFamily="2" charset="2"/>
+              </a:rPr>
+              <a:t>A barrier() in GLSL will stop the shader until the other instances reach it, and there are atomic (think interlock-exchange or locks) functions that allow uniforms/buffer data to be read/written by only one instance at a time. </a:t>
+            </a:r>
+          </a:p>
+          <a:p>
+            <a:r>
+              <a:rPr lang="en-CA" dirty="0">
+                <a:sym typeface="Wingdings" panose="05000000000000000000" pitchFamily="2" charset="2"/>
+              </a:rPr>
+              <a:t>However, you might consider ways to </a:t>
+            </a:r>
+            <a:r>
+              <a:rPr lang="en-CA" i="1" dirty="0">
+                <a:sym typeface="Wingdings" panose="05000000000000000000" pitchFamily="2" charset="2"/>
+              </a:rPr>
+              <a:t>not </a:t>
+            </a:r>
+            <a:r>
+              <a:rPr lang="en-CA" dirty="0">
+                <a:sym typeface="Wingdings" panose="05000000000000000000" pitchFamily="2" charset="2"/>
+              </a:rPr>
+              <a:t>do this, just to get your head around just how massive the threading is.</a:t>
+            </a:r>
+          </a:p>
+          <a:p>
+            <a:pPr lvl="1"/>
+            <a:r>
+              <a:rPr lang="en-CA" dirty="0">
+                <a:sym typeface="Wingdings" panose="05000000000000000000" pitchFamily="2" charset="2"/>
+              </a:rPr>
+              <a:t>i.e. think about copying one buffer to another buffer, rather than typical single threaded sort of algorithms/techniques</a:t>
+            </a:r>
+          </a:p>
+        </p:txBody>
+      </p:sp>
+    </p:spTree>
+    <p:extLst>
+      <p:ext uri="{BB962C8B-B14F-4D97-AF65-F5344CB8AC3E}">
+        <p14:creationId xmlns:p14="http://schemas.microsoft.com/office/powerpoint/2010/main" val="4183890911"/>
+      </p:ext>
+    </p:extLst>
+  </p:cSld>
+  <p:clrMapOvr>
+    <a:masterClrMapping/>
+  </p:clrMapOvr>
+</p:sld>
+</file>
+
+<file path=ppt/slides/slide16.xml><?xml version="1.0" encoding="utf-8"?>
+<p:sld xmlns:a="http://schemas.openxmlformats.org/drawingml/2006/main" xmlns:r="http://schemas.openxmlformats.org/officeDocument/2006/relationships" xmlns:p="http://schemas.openxmlformats.org/presentationml/2006/main">
+  <p:cSld>
+    <p:spTree>
+      <p:nvGrpSpPr>
+        <p:cNvPr id="1" name=""/>
+        <p:cNvGrpSpPr/>
+        <p:nvPr/>
+      </p:nvGrpSpPr>
+      <p:grpSpPr>
+        <a:xfrm>
+          <a:off x="0" y="0"/>
+          <a:ext cx="0" cy="0"/>
+          <a:chOff x="0" y="0"/>
+          <a:chExt cx="0" cy="0"/>
+        </a:xfrm>
+      </p:grpSpPr>
+      <p:pic>
+        <p:nvPicPr>
+          <p:cNvPr id="2050" name="Picture 2">
+            <a:extLst>
+              <a:ext uri="{FF2B5EF4-FFF2-40B4-BE49-F238E27FC236}">
+                <a16:creationId xmlns:a16="http://schemas.microsoft.com/office/drawing/2014/main" id="{CE8FEC6C-09EF-DE20-13F0-79B55220353A}"/>
+              </a:ext>
+            </a:extLst>
+          </p:cNvPr>
+          <p:cNvPicPr>
+            <a:picLocks noChangeAspect="1" noChangeArrowheads="1"/>
+          </p:cNvPicPr>
+          <p:nvPr/>
+        </p:nvPicPr>
+        <p:blipFill>
+          <a:blip r:embed="rId2">
+            <a:extLst>
+              <a:ext uri="{28A0092B-C50C-407E-A947-70E740481C1C}">
+                <a14:useLocalDpi xmlns:a14="http://schemas.microsoft.com/office/drawing/2010/main" val="0"/>
+              </a:ext>
+            </a:extLst>
+          </a:blip>
+          <a:srcRect/>
+          <a:stretch>
+            <a:fillRect/>
+          </a:stretch>
+        </p:blipFill>
+        <p:spPr bwMode="auto">
+          <a:xfrm>
+            <a:off x="242888" y="0"/>
+            <a:ext cx="11706225" cy="6858000"/>
+          </a:xfrm>
+          <a:prstGeom prst="rect">
+            <a:avLst/>
+          </a:prstGeom>
+          <a:noFill/>
+          <a:extLst>
+            <a:ext uri="{909E8E84-426E-40DD-AFC4-6F175D3DCCD1}">
+              <a14:hiddenFill xmlns:a14="http://schemas.microsoft.com/office/drawing/2010/main">
+                <a:solidFill>
+                  <a:srgbClr val="FFFFFF"/>
+                </a:solidFill>
+              </a14:hiddenFill>
+            </a:ext>
+          </a:extLst>
+        </p:spPr>
+      </p:pic>
+    </p:spTree>
+    <p:extLst>
+      <p:ext uri="{BB962C8B-B14F-4D97-AF65-F5344CB8AC3E}">
+        <p14:creationId xmlns:p14="http://schemas.microsoft.com/office/powerpoint/2010/main" val="1450578620"/>
+      </p:ext>
+    </p:extLst>
+  </p:cSld>
+  <p:clrMapOvr>
+    <a:masterClrMapping/>
+  </p:clrMapOvr>
+</p:sld>
+</file>
+
+<file path=ppt/slides/slide17.xml><?xml version="1.0" encoding="utf-8"?>
+<p:sld xmlns:a="http://schemas.openxmlformats.org/drawingml/2006/main" xmlns:r="http://schemas.openxmlformats.org/officeDocument/2006/relationships" xmlns:p="http://schemas.openxmlformats.org/presentationml/2006/main">
+  <p:cSld>
+    <p:spTree>
+      <p:nvGrpSpPr>
+        <p:cNvPr id="1" name=""/>
+        <p:cNvGrpSpPr/>
+        <p:nvPr/>
+      </p:nvGrpSpPr>
+      <p:grpSpPr>
+        <a:xfrm>
+          <a:off x="0" y="0"/>
+          <a:ext cx="0" cy="0"/>
+          <a:chOff x="0" y="0"/>
+          <a:chExt cx="0" cy="0"/>
+        </a:xfrm>
+      </p:grpSpPr>
+      <p:pic>
+        <p:nvPicPr>
+          <p:cNvPr id="2050" name="Picture 2">
+            <a:extLst>
+              <a:ext uri="{FF2B5EF4-FFF2-40B4-BE49-F238E27FC236}">
+                <a16:creationId xmlns:a16="http://schemas.microsoft.com/office/drawing/2014/main" id="{CE8FEC6C-09EF-DE20-13F0-79B55220353A}"/>
+              </a:ext>
+            </a:extLst>
+          </p:cNvPr>
+          <p:cNvPicPr>
+            <a:picLocks noChangeAspect="1" noChangeArrowheads="1"/>
+          </p:cNvPicPr>
+          <p:nvPr/>
+        </p:nvPicPr>
+        <p:blipFill>
+          <a:blip r:embed="rId2">
+            <a:extLst>
+              <a:ext uri="{28A0092B-C50C-407E-A947-70E740481C1C}">
+                <a14:useLocalDpi xmlns:a14="http://schemas.microsoft.com/office/drawing/2010/main" val="0"/>
+              </a:ext>
+            </a:extLst>
+          </a:blip>
+          <a:srcRect/>
+          <a:stretch>
+            <a:fillRect/>
+          </a:stretch>
+        </p:blipFill>
+        <p:spPr bwMode="auto">
+          <a:xfrm>
+            <a:off x="7410604" y="88490"/>
+            <a:ext cx="4358609" cy="2553457"/>
+          </a:xfrm>
+          <a:prstGeom prst="rect">
+            <a:avLst/>
+          </a:prstGeom>
+          <a:noFill/>
+          <a:extLst>
+            <a:ext uri="{909E8E84-426E-40DD-AFC4-6F175D3DCCD1}">
+              <a14:hiddenFill xmlns:a14="http://schemas.microsoft.com/office/drawing/2010/main">
+                <a:solidFill>
+                  <a:srgbClr val="FFFFFF"/>
+                </a:solidFill>
+              </a14:hiddenFill>
+            </a:ext>
+          </a:extLst>
+        </p:spPr>
+      </p:pic>
+      <p:sp>
+        <p:nvSpPr>
+          <p:cNvPr id="3" name="Content Placeholder 2">
+            <a:extLst>
+              <a:ext uri="{FF2B5EF4-FFF2-40B4-BE49-F238E27FC236}">
+                <a16:creationId xmlns:a16="http://schemas.microsoft.com/office/drawing/2014/main" id="{8D7A2D65-DBAF-DCD4-93E4-4A25A9D15DAF}"/>
+              </a:ext>
+            </a:extLst>
+          </p:cNvPr>
+          <p:cNvSpPr>
+            <a:spLocks noGrp="1"/>
+          </p:cNvSpPr>
+          <p:nvPr>
+            <p:ph idx="1"/>
+          </p:nvPr>
+        </p:nvSpPr>
+        <p:spPr>
+          <a:xfrm>
+            <a:off x="838200" y="550605"/>
+            <a:ext cx="10515600" cy="5626357"/>
+          </a:xfrm>
+        </p:spPr>
+        <p:txBody>
+          <a:bodyPr/>
+          <a:lstStyle/>
+          <a:p>
+            <a:r>
+              <a:rPr lang="en-CA" dirty="0"/>
+              <a:t>Lots of lights, say 1,000 lights.</a:t>
+            </a:r>
+          </a:p>
+          <a:p>
+            <a:r>
+              <a:rPr lang="en-CA" dirty="0"/>
+              <a:t>We have an array of lights</a:t>
+            </a:r>
+          </a:p>
+          <a:p>
+            <a:pPr lvl="1"/>
+            <a:r>
+              <a:rPr lang="en-CA" dirty="0"/>
+              <a:t>vec3 position[1,000]</a:t>
+            </a:r>
+          </a:p>
+          <a:p>
+            <a:r>
+              <a:rPr lang="en-CA" dirty="0"/>
+              <a:t>Passed as a uniform or a buffer…</a:t>
+            </a:r>
+          </a:p>
+          <a:p>
+            <a:r>
+              <a:rPr lang="en-CA" dirty="0"/>
+              <a:t>The compute knows that there’s 1000</a:t>
+            </a:r>
+          </a:p>
+          <a:p>
+            <a:pPr lvl="1"/>
+            <a:r>
+              <a:rPr lang="en-CA" dirty="0"/>
+              <a:t>Can go through a loop of all the lights from index 0 to 999</a:t>
+            </a:r>
+          </a:p>
+          <a:p>
+            <a:r>
+              <a:rPr lang="en-CA" dirty="0"/>
+              <a:t>BUT, in the 1</a:t>
+            </a:r>
+            <a:r>
+              <a:rPr lang="en-CA" baseline="30000" dirty="0"/>
+              <a:t>st</a:t>
+            </a:r>
+            <a:r>
+              <a:rPr lang="en-CA" dirty="0"/>
+              <a:t> pass of the deferred, we have multiple layers of the FBO (normal, world position, whatever)</a:t>
+            </a:r>
+          </a:p>
+          <a:p>
+            <a:r>
+              <a:rPr lang="en-CA" dirty="0"/>
+              <a:t>Let’s just consider the vertex world position.</a:t>
+            </a:r>
+          </a:p>
+          <a:p>
+            <a:r>
+              <a:rPr lang="en-CA" dirty="0"/>
+              <a:t>Remember this is a 2D texture (the FBO being 2D) and its height and width are the size of the FBO </a:t>
+            </a:r>
+            <a:r>
+              <a:rPr lang="en-CA" i="1" dirty="0"/>
+              <a:t>not </a:t>
+            </a:r>
+            <a:r>
+              <a:rPr lang="en-CA" dirty="0"/>
+              <a:t>the vertex position.</a:t>
+            </a:r>
+          </a:p>
+        </p:txBody>
+      </p:sp>
+    </p:spTree>
+    <p:extLst>
+      <p:ext uri="{BB962C8B-B14F-4D97-AF65-F5344CB8AC3E}">
+        <p14:creationId xmlns:p14="http://schemas.microsoft.com/office/powerpoint/2010/main" val="663505539"/>
+      </p:ext>
+    </p:extLst>
+  </p:cSld>
+  <p:clrMapOvr>
+    <a:masterClrMapping/>
+  </p:clrMapOvr>
+</p:sld>
+</file>
+
+<file path=ppt/slides/slide18.xml><?xml version="1.0" encoding="utf-8"?>
+<p:sld xmlns:a="http://schemas.openxmlformats.org/drawingml/2006/main" xmlns:r="http://schemas.openxmlformats.org/officeDocument/2006/relationships" xmlns:p="http://schemas.openxmlformats.org/presentationml/2006/main">
+  <p:cSld>
+    <p:spTree>
+      <p:nvGrpSpPr>
+        <p:cNvPr id="1" name=""/>
+        <p:cNvGrpSpPr/>
+        <p:nvPr/>
+      </p:nvGrpSpPr>
+      <p:grpSpPr>
+        <a:xfrm>
+          <a:off x="0" y="0"/>
+          <a:ext cx="0" cy="0"/>
+          <a:chOff x="0" y="0"/>
+          <a:chExt cx="0" cy="0"/>
+        </a:xfrm>
+      </p:grpSpPr>
+      <p:sp>
+        <p:nvSpPr>
+          <p:cNvPr id="3" name="Content Placeholder 2">
+            <a:extLst>
+              <a:ext uri="{FF2B5EF4-FFF2-40B4-BE49-F238E27FC236}">
+                <a16:creationId xmlns:a16="http://schemas.microsoft.com/office/drawing/2014/main" id="{8D7A2D65-DBAF-DCD4-93E4-4A25A9D15DAF}"/>
+              </a:ext>
+            </a:extLst>
+          </p:cNvPr>
+          <p:cNvSpPr>
+            <a:spLocks noGrp="1"/>
+          </p:cNvSpPr>
+          <p:nvPr>
+            <p:ph idx="1"/>
+          </p:nvPr>
+        </p:nvSpPr>
+        <p:spPr>
+          <a:xfrm>
+            <a:off x="838200" y="550605"/>
+            <a:ext cx="10515600" cy="5626357"/>
+          </a:xfrm>
+        </p:spPr>
+        <p:txBody>
+          <a:bodyPr>
+            <a:normAutofit lnSpcReduction="10000"/>
+          </a:bodyPr>
+          <a:lstStyle/>
+          <a:p>
+            <a:r>
+              <a:rPr lang="en-CA" dirty="0"/>
+              <a:t>Recall with referred, you get something like this:</a:t>
+            </a:r>
+          </a:p>
+          <a:p>
+            <a:r>
+              <a:rPr lang="en-CA" dirty="0"/>
+              <a:t>When you call the </a:t>
+            </a:r>
+            <a:br>
+              <a:rPr lang="en-CA" dirty="0"/>
+            </a:br>
+            <a:r>
+              <a:rPr lang="en-CA" dirty="0"/>
+              <a:t>fragment shader, </a:t>
+            </a:r>
+            <a:br>
+              <a:rPr lang="en-CA" dirty="0"/>
+            </a:br>
+            <a:r>
+              <a:rPr lang="en-CA" dirty="0"/>
+              <a:t>you are only looking at </a:t>
+            </a:r>
+            <a:br>
+              <a:rPr lang="en-CA" dirty="0"/>
+            </a:br>
+            <a:r>
+              <a:rPr lang="en-CA" dirty="0"/>
+              <a:t>the location in the FBO</a:t>
+            </a:r>
+            <a:br>
+              <a:rPr lang="en-CA" dirty="0"/>
+            </a:br>
+            <a:r>
+              <a:rPr lang="en-CA" dirty="0"/>
+              <a:t>textures by using the </a:t>
+            </a:r>
+            <a:br>
+              <a:rPr lang="en-CA" dirty="0"/>
+            </a:br>
+            <a:r>
+              <a:rPr lang="en-CA" dirty="0" err="1"/>
+              <a:t>gl_FragCoord</a:t>
+            </a:r>
+            <a:r>
+              <a:rPr lang="en-CA" dirty="0"/>
+              <a:t> values.</a:t>
+            </a:r>
+          </a:p>
+          <a:p>
+            <a:r>
+              <a:rPr lang="en-CA" dirty="0"/>
+              <a:t>You then calculate the</a:t>
+            </a:r>
+            <a:br>
+              <a:rPr lang="en-CA" dirty="0"/>
+            </a:br>
+            <a:r>
+              <a:rPr lang="en-CA" dirty="0"/>
+              <a:t>lighting by sampling the</a:t>
+            </a:r>
+            <a:br>
+              <a:rPr lang="en-CA" dirty="0"/>
+            </a:br>
+            <a:r>
+              <a:rPr lang="en-CA" dirty="0"/>
+              <a:t>same </a:t>
+            </a:r>
+            <a:r>
+              <a:rPr lang="en-CA" dirty="0" err="1"/>
+              <a:t>FragCoord</a:t>
+            </a:r>
+            <a:r>
+              <a:rPr lang="en-CA" dirty="0"/>
+              <a:t> from </a:t>
+            </a:r>
+            <a:br>
+              <a:rPr lang="en-CA" dirty="0"/>
+            </a:br>
+            <a:r>
+              <a:rPr lang="en-CA" dirty="0"/>
+              <a:t>all the textures </a:t>
+            </a:r>
+          </a:p>
+          <a:p>
+            <a:r>
+              <a:rPr lang="en-CA" dirty="0"/>
+              <a:t>Remember that the lighting</a:t>
+            </a:r>
+            <a:br>
+              <a:rPr lang="en-CA" dirty="0"/>
+            </a:br>
+            <a:r>
+              <a:rPr lang="en-CA" dirty="0"/>
+              <a:t>calculation is still pulling the light data from the uniform light values, like: </a:t>
+            </a:r>
+            <a:r>
+              <a:rPr lang="en-CA" b="1" dirty="0" err="1">
+                <a:latin typeface="Courier New" panose="02070309020205020404" pitchFamily="49" charset="0"/>
+                <a:cs typeface="Courier New" panose="02070309020205020404" pitchFamily="49" charset="0"/>
+              </a:rPr>
+              <a:t>sLight</a:t>
+            </a:r>
+            <a:r>
+              <a:rPr lang="en-CA" b="1" dirty="0">
+                <a:latin typeface="Courier New" panose="02070309020205020404" pitchFamily="49" charset="0"/>
+                <a:cs typeface="Courier New" panose="02070309020205020404" pitchFamily="49" charset="0"/>
+              </a:rPr>
+              <a:t> </a:t>
+            </a:r>
+            <a:r>
+              <a:rPr lang="en-CA" b="1" dirty="0" err="1">
+                <a:latin typeface="Courier New" panose="02070309020205020404" pitchFamily="49" charset="0"/>
+                <a:cs typeface="Courier New" panose="02070309020205020404" pitchFamily="49" charset="0"/>
+              </a:rPr>
+              <a:t>theLights</a:t>
+            </a:r>
+            <a:r>
+              <a:rPr lang="en-CA" b="1" dirty="0">
+                <a:latin typeface="Courier New" panose="02070309020205020404" pitchFamily="49" charset="0"/>
+                <a:cs typeface="Courier New" panose="02070309020205020404" pitchFamily="49" charset="0"/>
+              </a:rPr>
+              <a:t>[NUMBEROFLIGHTS];</a:t>
+            </a:r>
+          </a:p>
+        </p:txBody>
+      </p:sp>
+      <p:pic>
+        <p:nvPicPr>
+          <p:cNvPr id="3074" name="Picture 2" descr="Deferred Rendering">
+            <a:extLst>
+              <a:ext uri="{FF2B5EF4-FFF2-40B4-BE49-F238E27FC236}">
+                <a16:creationId xmlns:a16="http://schemas.microsoft.com/office/drawing/2014/main" id="{5F78AA70-4608-0E15-634C-2583DFB7971C}"/>
+              </a:ext>
+            </a:extLst>
+          </p:cNvPr>
+          <p:cNvPicPr>
+            <a:picLocks noChangeAspect="1" noChangeArrowheads="1"/>
+          </p:cNvPicPr>
+          <p:nvPr/>
+        </p:nvPicPr>
+        <p:blipFill>
+          <a:blip r:embed="rId2">
+            <a:extLst>
+              <a:ext uri="{28A0092B-C50C-407E-A947-70E740481C1C}">
+                <a14:useLocalDpi xmlns:a14="http://schemas.microsoft.com/office/drawing/2010/main" val="0"/>
+              </a:ext>
+            </a:extLst>
+          </a:blip>
+          <a:srcRect/>
+          <a:stretch>
+            <a:fillRect/>
+          </a:stretch>
+        </p:blipFill>
+        <p:spPr bwMode="auto">
+          <a:xfrm>
+            <a:off x="5360424" y="914565"/>
+            <a:ext cx="6186965" cy="3745925"/>
+          </a:xfrm>
+          <a:prstGeom prst="rect">
+            <a:avLst/>
+          </a:prstGeom>
+          <a:noFill/>
+          <a:extLst>
+            <a:ext uri="{909E8E84-426E-40DD-AFC4-6F175D3DCCD1}">
+              <a14:hiddenFill xmlns:a14="http://schemas.microsoft.com/office/drawing/2010/main">
+                <a:solidFill>
+                  <a:srgbClr val="FFFFFF"/>
+                </a:solidFill>
+              </a14:hiddenFill>
+            </a:ext>
+          </a:extLst>
+        </p:spPr>
+      </p:pic>
+      <p:sp>
+        <p:nvSpPr>
+          <p:cNvPr id="2" name="Oval 1">
+            <a:extLst>
+              <a:ext uri="{FF2B5EF4-FFF2-40B4-BE49-F238E27FC236}">
+                <a16:creationId xmlns:a16="http://schemas.microsoft.com/office/drawing/2014/main" id="{54F1EC09-C0D7-935D-7906-6464A5D4EEDC}"/>
+              </a:ext>
+            </a:extLst>
+          </p:cNvPr>
+          <p:cNvSpPr/>
+          <p:nvPr/>
+        </p:nvSpPr>
+        <p:spPr>
+          <a:xfrm>
+            <a:off x="6725263" y="2143516"/>
+            <a:ext cx="285135" cy="285135"/>
+          </a:xfrm>
+          <a:prstGeom prst="ellipse">
+            <a:avLst/>
+          </a:prstGeom>
+        </p:spPr>
+        <p:style>
+          <a:lnRef idx="2">
+            <a:schemeClr val="accent1">
+              <a:shade val="15000"/>
+            </a:schemeClr>
+          </a:lnRef>
+          <a:fillRef idx="1">
+            <a:schemeClr val="accent1"/>
+          </a:fillRef>
+          <a:effectRef idx="0">
+            <a:schemeClr val="accent1"/>
+          </a:effectRef>
+          <a:fontRef idx="minor">
+            <a:schemeClr val="lt1"/>
+          </a:fontRef>
+        </p:style>
+        <p:txBody>
+          <a:bodyPr rtlCol="0" anchor="ctr"/>
+          <a:lstStyle/>
+          <a:p>
+            <a:pPr algn="ctr"/>
+            <a:endParaRPr lang="en-CA"/>
+          </a:p>
+        </p:txBody>
+      </p:sp>
+      <p:sp>
+        <p:nvSpPr>
+          <p:cNvPr id="4" name="Oval 3">
+            <a:extLst>
+              <a:ext uri="{FF2B5EF4-FFF2-40B4-BE49-F238E27FC236}">
+                <a16:creationId xmlns:a16="http://schemas.microsoft.com/office/drawing/2014/main" id="{75AD7ABE-E0FA-ECC2-7FF5-420BAB29BF83}"/>
+              </a:ext>
+            </a:extLst>
+          </p:cNvPr>
+          <p:cNvSpPr/>
+          <p:nvPr/>
+        </p:nvSpPr>
+        <p:spPr>
+          <a:xfrm>
+            <a:off x="9901083" y="2202425"/>
+            <a:ext cx="285135" cy="285135"/>
+          </a:xfrm>
+          <a:prstGeom prst="ellipse">
+            <a:avLst/>
+          </a:prstGeom>
+        </p:spPr>
+        <p:style>
+          <a:lnRef idx="2">
+            <a:schemeClr val="accent1">
+              <a:shade val="15000"/>
+            </a:schemeClr>
+          </a:lnRef>
+          <a:fillRef idx="1">
+            <a:schemeClr val="accent1"/>
+          </a:fillRef>
+          <a:effectRef idx="0">
+            <a:schemeClr val="accent1"/>
+          </a:effectRef>
+          <a:fontRef idx="minor">
+            <a:schemeClr val="lt1"/>
+          </a:fontRef>
+        </p:style>
+        <p:txBody>
+          <a:bodyPr rtlCol="0" anchor="ctr"/>
+          <a:lstStyle/>
+          <a:p>
+            <a:pPr algn="ctr"/>
+            <a:endParaRPr lang="en-CA"/>
+          </a:p>
+        </p:txBody>
+      </p:sp>
+      <p:sp>
+        <p:nvSpPr>
+          <p:cNvPr id="5" name="Oval 4">
+            <a:extLst>
+              <a:ext uri="{FF2B5EF4-FFF2-40B4-BE49-F238E27FC236}">
+                <a16:creationId xmlns:a16="http://schemas.microsoft.com/office/drawing/2014/main" id="{E0CF47C3-29D4-5F05-252B-828CE62E27E0}"/>
+              </a:ext>
+            </a:extLst>
+          </p:cNvPr>
+          <p:cNvSpPr/>
+          <p:nvPr/>
+        </p:nvSpPr>
+        <p:spPr>
+          <a:xfrm>
+            <a:off x="6725263" y="4227872"/>
+            <a:ext cx="285135" cy="285135"/>
+          </a:xfrm>
+          <a:prstGeom prst="ellipse">
+            <a:avLst/>
+          </a:prstGeom>
+        </p:spPr>
+        <p:style>
+          <a:lnRef idx="2">
+            <a:schemeClr val="accent1">
+              <a:shade val="15000"/>
+            </a:schemeClr>
+          </a:lnRef>
+          <a:fillRef idx="1">
+            <a:schemeClr val="accent1"/>
+          </a:fillRef>
+          <a:effectRef idx="0">
+            <a:schemeClr val="accent1"/>
+          </a:effectRef>
+          <a:fontRef idx="minor">
+            <a:schemeClr val="lt1"/>
+          </a:fontRef>
+        </p:style>
+        <p:txBody>
+          <a:bodyPr rtlCol="0" anchor="ctr"/>
+          <a:lstStyle/>
+          <a:p>
+            <a:pPr algn="ctr"/>
+            <a:endParaRPr lang="en-CA"/>
+          </a:p>
+        </p:txBody>
+      </p:sp>
+      <p:sp>
+        <p:nvSpPr>
+          <p:cNvPr id="6" name="Oval 5">
+            <a:extLst>
+              <a:ext uri="{FF2B5EF4-FFF2-40B4-BE49-F238E27FC236}">
+                <a16:creationId xmlns:a16="http://schemas.microsoft.com/office/drawing/2014/main" id="{8F6926A7-AD15-CCA6-D66F-BA80E0A77052}"/>
+              </a:ext>
+            </a:extLst>
+          </p:cNvPr>
+          <p:cNvSpPr/>
+          <p:nvPr/>
+        </p:nvSpPr>
+        <p:spPr>
+          <a:xfrm>
+            <a:off x="9876501" y="4227872"/>
+            <a:ext cx="285135" cy="285135"/>
+          </a:xfrm>
+          <a:prstGeom prst="ellipse">
+            <a:avLst/>
+          </a:prstGeom>
+        </p:spPr>
+        <p:style>
+          <a:lnRef idx="2">
+            <a:schemeClr val="accent1">
+              <a:shade val="15000"/>
+            </a:schemeClr>
+          </a:lnRef>
+          <a:fillRef idx="1">
+            <a:schemeClr val="accent1"/>
+          </a:fillRef>
+          <a:effectRef idx="0">
+            <a:schemeClr val="accent1"/>
+          </a:effectRef>
+          <a:fontRef idx="minor">
+            <a:schemeClr val="lt1"/>
+          </a:fontRef>
+        </p:style>
+        <p:txBody>
+          <a:bodyPr rtlCol="0" anchor="ctr"/>
+          <a:lstStyle/>
+          <a:p>
+            <a:pPr algn="ctr"/>
+            <a:endParaRPr lang="en-CA"/>
+          </a:p>
+        </p:txBody>
+      </p:sp>
+    </p:spTree>
+    <p:extLst>
+      <p:ext uri="{BB962C8B-B14F-4D97-AF65-F5344CB8AC3E}">
+        <p14:creationId xmlns:p14="http://schemas.microsoft.com/office/powerpoint/2010/main" val="1924591073"/>
+      </p:ext>
+    </p:extLst>
+  </p:cSld>
+  <p:clrMapOvr>
+    <a:masterClrMapping/>
+  </p:clrMapOvr>
+</p:sld>
+</file>
+
+<file path=ppt/slides/slide19.xml><?xml version="1.0" encoding="utf-8"?>
+<p:sld xmlns:a="http://schemas.openxmlformats.org/drawingml/2006/main" xmlns:r="http://schemas.openxmlformats.org/officeDocument/2006/relationships" xmlns:p="http://schemas.openxmlformats.org/presentationml/2006/main">
+  <p:cSld>
+    <p:spTree>
+      <p:nvGrpSpPr>
+        <p:cNvPr id="1" name=""/>
+        <p:cNvGrpSpPr/>
+        <p:nvPr/>
+      </p:nvGrpSpPr>
+      <p:grpSpPr>
+        <a:xfrm>
+          <a:off x="0" y="0"/>
+          <a:ext cx="0" cy="0"/>
+          <a:chOff x="0" y="0"/>
+          <a:chExt cx="0" cy="0"/>
+        </a:xfrm>
+      </p:grpSpPr>
+      <p:pic>
+        <p:nvPicPr>
+          <p:cNvPr id="2050" name="Picture 2">
+            <a:extLst>
+              <a:ext uri="{FF2B5EF4-FFF2-40B4-BE49-F238E27FC236}">
+                <a16:creationId xmlns:a16="http://schemas.microsoft.com/office/drawing/2014/main" id="{CE8FEC6C-09EF-DE20-13F0-79B55220353A}"/>
+              </a:ext>
+            </a:extLst>
+          </p:cNvPr>
+          <p:cNvPicPr>
+            <a:picLocks noChangeAspect="1" noChangeArrowheads="1"/>
+          </p:cNvPicPr>
+          <p:nvPr/>
+        </p:nvPicPr>
+        <p:blipFill>
+          <a:blip r:embed="rId2">
+            <a:extLst>
+              <a:ext uri="{28A0092B-C50C-407E-A947-70E740481C1C}">
+                <a14:useLocalDpi xmlns:a14="http://schemas.microsoft.com/office/drawing/2010/main" val="0"/>
+              </a:ext>
+            </a:extLst>
+          </a:blip>
+          <a:srcRect/>
+          <a:stretch>
+            <a:fillRect/>
+          </a:stretch>
+        </p:blipFill>
+        <p:spPr bwMode="auto">
+          <a:xfrm>
+            <a:off x="7626915" y="0"/>
+            <a:ext cx="4014480" cy="2351852"/>
+          </a:xfrm>
+          <a:prstGeom prst="rect">
+            <a:avLst/>
+          </a:prstGeom>
+          <a:noFill/>
+          <a:extLst>
+            <a:ext uri="{909E8E84-426E-40DD-AFC4-6F175D3DCCD1}">
+              <a14:hiddenFill xmlns:a14="http://schemas.microsoft.com/office/drawing/2010/main">
+                <a:solidFill>
+                  <a:srgbClr val="FFFFFF"/>
+                </a:solidFill>
+              </a14:hiddenFill>
+            </a:ext>
+          </a:extLst>
+        </p:spPr>
+      </p:pic>
+      <p:sp>
+        <p:nvSpPr>
+          <p:cNvPr id="3" name="Content Placeholder 2">
+            <a:extLst>
+              <a:ext uri="{FF2B5EF4-FFF2-40B4-BE49-F238E27FC236}">
+                <a16:creationId xmlns:a16="http://schemas.microsoft.com/office/drawing/2014/main" id="{8D7A2D65-DBAF-DCD4-93E4-4A25A9D15DAF}"/>
+              </a:ext>
+            </a:extLst>
+          </p:cNvPr>
+          <p:cNvSpPr>
+            <a:spLocks noGrp="1"/>
+          </p:cNvSpPr>
+          <p:nvPr>
+            <p:ph idx="1"/>
+          </p:nvPr>
+        </p:nvSpPr>
+        <p:spPr>
+          <a:xfrm>
+            <a:off x="838200" y="550605"/>
+            <a:ext cx="10515600" cy="5626357"/>
+          </a:xfrm>
+        </p:spPr>
+        <p:txBody>
+          <a:bodyPr>
+            <a:normAutofit fontScale="92500" lnSpcReduction="10000"/>
+          </a:bodyPr>
+          <a:lstStyle/>
+          <a:p>
+            <a:r>
+              <a:rPr lang="en-CA" dirty="0"/>
+              <a:t>Lots of lights, say 1,000 lights.</a:t>
+            </a:r>
+          </a:p>
+          <a:p>
+            <a:r>
+              <a:rPr lang="en-CA" dirty="0"/>
+              <a:t>We have an array of lights</a:t>
+            </a:r>
+          </a:p>
+          <a:p>
+            <a:pPr lvl="1"/>
+            <a:r>
+              <a:rPr lang="en-CA" dirty="0"/>
+              <a:t>vec3 </a:t>
+            </a:r>
+            <a:r>
+              <a:rPr lang="en-CA" dirty="0" err="1"/>
+              <a:t>lightPosition</a:t>
+            </a:r>
+            <a:r>
+              <a:rPr lang="en-CA" dirty="0"/>
+              <a:t>[1,000]</a:t>
+            </a:r>
+          </a:p>
+          <a:p>
+            <a:r>
+              <a:rPr lang="en-CA" dirty="0"/>
+              <a:t>We can use the </a:t>
+            </a:r>
+            <a:r>
+              <a:rPr lang="en-CA" dirty="0" err="1"/>
+              <a:t>FragCoord</a:t>
+            </a:r>
+            <a:r>
+              <a:rPr lang="en-CA" dirty="0"/>
+              <a:t> to determine</a:t>
+            </a:r>
+            <a:br>
+              <a:rPr lang="en-CA" dirty="0"/>
+            </a:br>
+            <a:r>
+              <a:rPr lang="en-CA" dirty="0"/>
+              <a:t>where we are in the scene, but then </a:t>
+            </a:r>
+            <a:br>
+              <a:rPr lang="en-CA" dirty="0"/>
+            </a:br>
+            <a:r>
+              <a:rPr lang="en-CA" dirty="0"/>
+              <a:t>go through just the light </a:t>
+            </a:r>
+            <a:r>
+              <a:rPr lang="en-CA" i="1" dirty="0"/>
+              <a:t>positions </a:t>
+            </a:r>
+            <a:r>
+              <a:rPr lang="en-CA" dirty="0"/>
+              <a:t>(in that 1D array) and output a bunch of indices matching the “closest” lights.</a:t>
+            </a:r>
+          </a:p>
+          <a:p>
+            <a:r>
+              <a:rPr lang="en-CA" dirty="0"/>
+              <a:t>Let’s say:</a:t>
+            </a:r>
+          </a:p>
+          <a:p>
+            <a:pPr lvl="1"/>
+            <a:r>
+              <a:rPr lang="en-CA" dirty="0"/>
+              <a:t>The FBO is a 2D texture with vec4s – indicating the vertex world position</a:t>
+            </a:r>
+          </a:p>
+          <a:p>
+            <a:pPr lvl="1"/>
+            <a:r>
+              <a:rPr lang="en-CA" dirty="0"/>
+              <a:t>The output is also a 2D texture with vec4s (say), BUT these 4 values are the light index from the </a:t>
+            </a:r>
+            <a:r>
+              <a:rPr lang="en-CA" dirty="0" err="1"/>
+              <a:t>lightPosition</a:t>
+            </a:r>
+            <a:r>
+              <a:rPr lang="en-CA" dirty="0"/>
+              <a:t> array above</a:t>
+            </a:r>
+          </a:p>
+          <a:p>
+            <a:r>
+              <a:rPr lang="en-CA" dirty="0"/>
+              <a:t>They take in all 1000 light positions, and output only the “closest 4” values. </a:t>
+            </a:r>
+          </a:p>
+          <a:p>
+            <a:r>
+              <a:rPr lang="en-CA" dirty="0"/>
+              <a:t>Then the next pass (the fragment shader) reads the output from the compute and uses those 4 indices to lookup the 4 closest lights.</a:t>
+            </a:r>
+          </a:p>
+        </p:txBody>
+      </p:sp>
+      <p:sp>
+        <p:nvSpPr>
+          <p:cNvPr id="2" name="Oval 1">
+            <a:extLst>
+              <a:ext uri="{FF2B5EF4-FFF2-40B4-BE49-F238E27FC236}">
+                <a16:creationId xmlns:a16="http://schemas.microsoft.com/office/drawing/2014/main" id="{4635D193-95B2-C091-BB21-17142BB30A8C}"/>
+              </a:ext>
+            </a:extLst>
+          </p:cNvPr>
+          <p:cNvSpPr/>
+          <p:nvPr/>
+        </p:nvSpPr>
+        <p:spPr>
+          <a:xfrm>
+            <a:off x="8534399" y="681038"/>
+            <a:ext cx="285135" cy="285135"/>
+          </a:xfrm>
+          <a:prstGeom prst="ellipse">
+            <a:avLst/>
+          </a:prstGeom>
+        </p:spPr>
+        <p:style>
+          <a:lnRef idx="1">
+            <a:schemeClr val="accent6"/>
+          </a:lnRef>
+          <a:fillRef idx="2">
+            <a:schemeClr val="accent6"/>
+          </a:fillRef>
+          <a:effectRef idx="1">
+            <a:schemeClr val="accent6"/>
+          </a:effectRef>
+          <a:fontRef idx="minor">
+            <a:schemeClr val="dk1"/>
+          </a:fontRef>
+        </p:style>
+        <p:txBody>
+          <a:bodyPr rtlCol="0" anchor="ctr"/>
+          <a:lstStyle/>
+          <a:p>
+            <a:pPr algn="ctr"/>
+            <a:endParaRPr lang="en-CA"/>
+          </a:p>
+        </p:txBody>
+      </p:sp>
+      <p:sp>
+        <p:nvSpPr>
+          <p:cNvPr id="4" name="Rectangle 3">
+            <a:extLst>
+              <a:ext uri="{FF2B5EF4-FFF2-40B4-BE49-F238E27FC236}">
+                <a16:creationId xmlns:a16="http://schemas.microsoft.com/office/drawing/2014/main" id="{7DAF0605-6A80-DA0D-A0C9-27A88E066296}"/>
+              </a:ext>
+            </a:extLst>
+          </p:cNvPr>
+          <p:cNvSpPr/>
+          <p:nvPr/>
+        </p:nvSpPr>
+        <p:spPr>
+          <a:xfrm>
+            <a:off x="10204655" y="1582994"/>
+            <a:ext cx="462116" cy="462116"/>
+          </a:xfrm>
+          <a:prstGeom prst="rect">
+            <a:avLst/>
+          </a:prstGeom>
+        </p:spPr>
+        <p:style>
+          <a:lnRef idx="2">
+            <a:schemeClr val="accent1">
+              <a:shade val="15000"/>
+            </a:schemeClr>
+          </a:lnRef>
+          <a:fillRef idx="1">
+            <a:schemeClr val="accent1"/>
+          </a:fillRef>
+          <a:effectRef idx="0">
+            <a:schemeClr val="accent1"/>
+          </a:effectRef>
+          <a:fontRef idx="minor">
+            <a:schemeClr val="lt1"/>
+          </a:fontRef>
+        </p:style>
+        <p:txBody>
+          <a:bodyPr rtlCol="0" anchor="ctr"/>
+          <a:lstStyle/>
+          <a:p>
+            <a:pPr algn="ctr"/>
+            <a:endParaRPr lang="en-CA"/>
+          </a:p>
+        </p:txBody>
+      </p:sp>
+    </p:spTree>
+    <p:extLst>
+      <p:ext uri="{BB962C8B-B14F-4D97-AF65-F5344CB8AC3E}">
+        <p14:creationId xmlns:p14="http://schemas.microsoft.com/office/powerpoint/2010/main" val="3459323569"/>
       </p:ext>
     </p:extLst>
   </p:cSld>
@@ -7213,6 +8595,1182 @@
 </p:sld>
 </file>
 
+<file path=ppt/slides/slide20.xml><?xml version="1.0" encoding="utf-8"?>
+<p:sld xmlns:a="http://schemas.openxmlformats.org/drawingml/2006/main" xmlns:r="http://schemas.openxmlformats.org/officeDocument/2006/relationships" xmlns:p="http://schemas.openxmlformats.org/presentationml/2006/main">
+  <p:cSld>
+    <p:spTree>
+      <p:nvGrpSpPr>
+        <p:cNvPr id="1" name=""/>
+        <p:cNvGrpSpPr/>
+        <p:nvPr/>
+      </p:nvGrpSpPr>
+      <p:grpSpPr>
+        <a:xfrm>
+          <a:off x="0" y="0"/>
+          <a:ext cx="0" cy="0"/>
+          <a:chOff x="0" y="0"/>
+          <a:chExt cx="0" cy="0"/>
+        </a:xfrm>
+      </p:grpSpPr>
+      <p:sp>
+        <p:nvSpPr>
+          <p:cNvPr id="2" name="Title 1">
+            <a:extLst>
+              <a:ext uri="{FF2B5EF4-FFF2-40B4-BE49-F238E27FC236}">
+                <a16:creationId xmlns:a16="http://schemas.microsoft.com/office/drawing/2014/main" id="{EAEACA72-A057-0FFF-63AD-F586A212CFBD}"/>
+              </a:ext>
+            </a:extLst>
+          </p:cNvPr>
+          <p:cNvSpPr>
+            <a:spLocks noGrp="1"/>
+          </p:cNvSpPr>
+          <p:nvPr>
+            <p:ph type="title"/>
+          </p:nvPr>
+        </p:nvSpPr>
+        <p:spPr/>
+        <p:txBody>
+          <a:bodyPr/>
+          <a:lstStyle/>
+          <a:p>
+            <a:r>
+              <a:rPr lang="en-CA" dirty="0"/>
+              <a:t>Getting data into and out of the compute</a:t>
+            </a:r>
+          </a:p>
+        </p:txBody>
+      </p:sp>
+      <p:sp>
+        <p:nvSpPr>
+          <p:cNvPr id="3" name="Content Placeholder 2">
+            <a:extLst>
+              <a:ext uri="{FF2B5EF4-FFF2-40B4-BE49-F238E27FC236}">
+                <a16:creationId xmlns:a16="http://schemas.microsoft.com/office/drawing/2014/main" id="{287F3E45-D655-042F-6E8C-32F172A0845D}"/>
+              </a:ext>
+            </a:extLst>
+          </p:cNvPr>
+          <p:cNvSpPr>
+            <a:spLocks noGrp="1"/>
+          </p:cNvSpPr>
+          <p:nvPr>
+            <p:ph idx="1"/>
+          </p:nvPr>
+        </p:nvSpPr>
+        <p:spPr/>
+        <p:txBody>
+          <a:bodyPr>
+            <a:normAutofit lnSpcReduction="10000"/>
+          </a:bodyPr>
+          <a:lstStyle/>
+          <a:p>
+            <a:r>
+              <a:rPr lang="en-CA" dirty="0"/>
+              <a:t>Can use a “texture” or a buffer, but let’s use an example that’s a combination of the </a:t>
+            </a:r>
+            <a:r>
+              <a:rPr lang="en-CA" dirty="0" err="1"/>
+              <a:t>LearnOpenGL</a:t>
+            </a:r>
+            <a:r>
+              <a:rPr lang="en-CA" dirty="0"/>
+              <a:t> site (a great site) and the </a:t>
+            </a:r>
+            <a:r>
+              <a:rPr lang="en-CA" dirty="0" err="1"/>
+              <a:t>TextureManager</a:t>
+            </a:r>
+            <a:r>
+              <a:rPr lang="en-CA" dirty="0"/>
+              <a:t>/loader thing in the example code.</a:t>
+            </a:r>
+          </a:p>
+          <a:p>
+            <a:r>
+              <a:rPr lang="en-CA" dirty="0"/>
+              <a:t>The example code takes a 24 bit bitmap, where each RGB is 8 bits:</a:t>
+            </a:r>
+          </a:p>
+          <a:p>
+            <a:r>
+              <a:rPr lang="en-CA" dirty="0"/>
+              <a:t>CTextureFromBMP.cpp around line 550: </a:t>
+            </a:r>
+          </a:p>
+          <a:p>
+            <a:r>
+              <a:rPr lang="en-CA" sz="1800" dirty="0">
+                <a:solidFill>
+                  <a:srgbClr val="008000"/>
+                </a:solidFill>
+                <a:latin typeface="Cascadia Mono" panose="020B0609020000020004" pitchFamily="49" charset="0"/>
+              </a:rPr>
+              <a:t>//</a:t>
+            </a:r>
+            <a:r>
+              <a:rPr lang="en-CA" sz="1800" dirty="0" err="1">
+                <a:solidFill>
+                  <a:srgbClr val="008000"/>
+                </a:solidFill>
+                <a:latin typeface="Cascadia Mono" panose="020B0609020000020004" pitchFamily="49" charset="0"/>
+              </a:rPr>
+              <a:t>uchar</a:t>
+            </a:r>
+            <a:r>
+              <a:rPr lang="en-CA" sz="1800" dirty="0">
+                <a:solidFill>
+                  <a:srgbClr val="008000"/>
+                </a:solidFill>
+                <a:latin typeface="Cascadia Mono" panose="020B0609020000020004" pitchFamily="49" charset="0"/>
+              </a:rPr>
+              <a:t> </a:t>
+            </a:r>
+            <a:r>
+              <a:rPr lang="en-CA" sz="1800" dirty="0" err="1">
+                <a:solidFill>
+                  <a:srgbClr val="008000"/>
+                </a:solidFill>
+                <a:latin typeface="Cascadia Mono" panose="020B0609020000020004" pitchFamily="49" charset="0"/>
+              </a:rPr>
+              <a:t>redPixel</a:t>
+            </a:r>
+            <a:r>
+              <a:rPr lang="en-CA" sz="1800" dirty="0">
+                <a:solidFill>
+                  <a:srgbClr val="008000"/>
+                </a:solidFill>
+                <a:latin typeface="Cascadia Mono" panose="020B0609020000020004" pitchFamily="49" charset="0"/>
+              </a:rPr>
+              <a:t>;		</a:t>
+            </a:r>
+            <a:r>
+              <a:rPr lang="en-US" sz="1800" dirty="0">
+                <a:solidFill>
+                  <a:srgbClr val="2B91AF"/>
+                </a:solidFill>
+                <a:latin typeface="Cascadia Mono" panose="020B0609020000020004" pitchFamily="49" charset="0"/>
+                <a:sym typeface="Wingdings" panose="05000000000000000000" pitchFamily="2" charset="2"/>
+              </a:rPr>
+              <a:t> </a:t>
+            </a:r>
+            <a:r>
+              <a:rPr lang="en-US" sz="1800" dirty="0">
+                <a:solidFill>
+                  <a:srgbClr val="2B91AF"/>
+                </a:solidFill>
+                <a:latin typeface="Cascadia Mono" panose="020B0609020000020004" pitchFamily="49" charset="0"/>
+              </a:rPr>
+              <a:t>C24BitBMPpixel</a:t>
+            </a:r>
+            <a:endParaRPr lang="en-CA" sz="1800" dirty="0">
+              <a:solidFill>
+                <a:srgbClr val="000000"/>
+              </a:solidFill>
+              <a:latin typeface="Cascadia Mono" panose="020B0609020000020004" pitchFamily="49" charset="0"/>
+            </a:endParaRPr>
+          </a:p>
+          <a:p>
+            <a:r>
+              <a:rPr lang="en-CA" sz="1800" dirty="0">
+                <a:solidFill>
+                  <a:srgbClr val="008000"/>
+                </a:solidFill>
+                <a:latin typeface="Cascadia Mono" panose="020B0609020000020004" pitchFamily="49" charset="0"/>
+              </a:rPr>
+              <a:t>//</a:t>
+            </a:r>
+            <a:r>
+              <a:rPr lang="en-CA" sz="1800" dirty="0" err="1">
+                <a:solidFill>
+                  <a:srgbClr val="008000"/>
+                </a:solidFill>
+                <a:latin typeface="Cascadia Mono" panose="020B0609020000020004" pitchFamily="49" charset="0"/>
+              </a:rPr>
+              <a:t>uchar</a:t>
+            </a:r>
+            <a:r>
+              <a:rPr lang="en-CA" sz="1800" dirty="0">
+                <a:solidFill>
+                  <a:srgbClr val="008000"/>
+                </a:solidFill>
+                <a:latin typeface="Cascadia Mono" panose="020B0609020000020004" pitchFamily="49" charset="0"/>
+              </a:rPr>
+              <a:t> </a:t>
+            </a:r>
+            <a:r>
+              <a:rPr lang="en-CA" sz="1800" dirty="0" err="1">
+                <a:solidFill>
+                  <a:srgbClr val="008000"/>
+                </a:solidFill>
+                <a:latin typeface="Cascadia Mono" panose="020B0609020000020004" pitchFamily="49" charset="0"/>
+              </a:rPr>
+              <a:t>greenPixel</a:t>
+            </a:r>
+            <a:r>
+              <a:rPr lang="en-CA" sz="1800" dirty="0">
+                <a:solidFill>
+                  <a:srgbClr val="008000"/>
+                </a:solidFill>
+                <a:latin typeface="Cascadia Mono" panose="020B0609020000020004" pitchFamily="49" charset="0"/>
+              </a:rPr>
+              <a:t>;</a:t>
+            </a:r>
+            <a:endParaRPr lang="en-CA" sz="1800" dirty="0">
+              <a:solidFill>
+                <a:srgbClr val="000000"/>
+              </a:solidFill>
+              <a:latin typeface="Cascadia Mono" panose="020B0609020000020004" pitchFamily="49" charset="0"/>
+            </a:endParaRPr>
+          </a:p>
+          <a:p>
+            <a:r>
+              <a:rPr lang="en-CA" sz="1800" dirty="0">
+                <a:solidFill>
+                  <a:srgbClr val="008000"/>
+                </a:solidFill>
+                <a:latin typeface="Cascadia Mono" panose="020B0609020000020004" pitchFamily="49" charset="0"/>
+              </a:rPr>
+              <a:t>//</a:t>
+            </a:r>
+            <a:r>
+              <a:rPr lang="en-CA" sz="1800" dirty="0" err="1">
+                <a:solidFill>
+                  <a:srgbClr val="008000"/>
+                </a:solidFill>
+                <a:latin typeface="Cascadia Mono" panose="020B0609020000020004" pitchFamily="49" charset="0"/>
+              </a:rPr>
+              <a:t>uchar</a:t>
+            </a:r>
+            <a:r>
+              <a:rPr lang="en-CA" sz="1800" dirty="0">
+                <a:solidFill>
+                  <a:srgbClr val="008000"/>
+                </a:solidFill>
+                <a:latin typeface="Cascadia Mono" panose="020B0609020000020004" pitchFamily="49" charset="0"/>
+              </a:rPr>
+              <a:t> </a:t>
+            </a:r>
+            <a:r>
+              <a:rPr lang="en-CA" sz="1800" dirty="0" err="1">
+                <a:solidFill>
+                  <a:srgbClr val="008000"/>
+                </a:solidFill>
+                <a:latin typeface="Cascadia Mono" panose="020B0609020000020004" pitchFamily="49" charset="0"/>
+              </a:rPr>
+              <a:t>bluePixel</a:t>
+            </a:r>
+            <a:r>
+              <a:rPr lang="en-CA" sz="1800" dirty="0">
+                <a:solidFill>
+                  <a:srgbClr val="008000"/>
+                </a:solidFill>
+                <a:latin typeface="Cascadia Mono" panose="020B0609020000020004" pitchFamily="49" charset="0"/>
+              </a:rPr>
+              <a:t>;</a:t>
+            </a:r>
+            <a:endParaRPr lang="en-CA" sz="1800" dirty="0">
+              <a:solidFill>
+                <a:srgbClr val="000000"/>
+              </a:solidFill>
+              <a:latin typeface="Cascadia Mono" panose="020B0609020000020004" pitchFamily="49" charset="0"/>
+            </a:endParaRPr>
+          </a:p>
+          <a:p>
+            <a:r>
+              <a:rPr lang="en-US" sz="1800" dirty="0">
+                <a:solidFill>
+                  <a:srgbClr val="0000FF"/>
+                </a:solidFill>
+                <a:latin typeface="Cascadia Mono" panose="020B0609020000020004" pitchFamily="49" charset="0"/>
+              </a:rPr>
+              <a:t>this</a:t>
+            </a:r>
+            <a:r>
+              <a:rPr lang="en-US" sz="1800" dirty="0">
+                <a:solidFill>
+                  <a:srgbClr val="000000"/>
+                </a:solidFill>
+                <a:latin typeface="Cascadia Mono" panose="020B0609020000020004" pitchFamily="49" charset="0"/>
+              </a:rPr>
+              <a:t>-&gt;</a:t>
+            </a:r>
+            <a:r>
+              <a:rPr lang="en-US" sz="1800" dirty="0" err="1">
+                <a:solidFill>
+                  <a:srgbClr val="000000"/>
+                </a:solidFill>
+                <a:latin typeface="Cascadia Mono" panose="020B0609020000020004" pitchFamily="49" charset="0"/>
+              </a:rPr>
+              <a:t>m_p_theImages</a:t>
+            </a:r>
+            <a:r>
+              <a:rPr lang="en-US" sz="1800" dirty="0">
+                <a:solidFill>
+                  <a:srgbClr val="000000"/>
+                </a:solidFill>
+                <a:latin typeface="Cascadia Mono" panose="020B0609020000020004" pitchFamily="49" charset="0"/>
+              </a:rPr>
+              <a:t> = </a:t>
+            </a:r>
+            <a:br>
+              <a:rPr lang="en-US" sz="1800" dirty="0">
+                <a:solidFill>
+                  <a:srgbClr val="000000"/>
+                </a:solidFill>
+                <a:latin typeface="Cascadia Mono" panose="020B0609020000020004" pitchFamily="49" charset="0"/>
+              </a:rPr>
+            </a:br>
+            <a:r>
+              <a:rPr lang="en-US" sz="1800" dirty="0">
+                <a:solidFill>
+                  <a:srgbClr val="000000"/>
+                </a:solidFill>
+                <a:latin typeface="Cascadia Mono" panose="020B0609020000020004" pitchFamily="49" charset="0"/>
+              </a:rPr>
+              <a:t>       </a:t>
+            </a:r>
+            <a:r>
+              <a:rPr lang="en-US" sz="1800" dirty="0">
+                <a:solidFill>
+                  <a:srgbClr val="0000FF"/>
+                </a:solidFill>
+                <a:latin typeface="Cascadia Mono" panose="020B0609020000020004" pitchFamily="49" charset="0"/>
+              </a:rPr>
+              <a:t>new</a:t>
+            </a:r>
+            <a:r>
+              <a:rPr lang="en-US" sz="1800" dirty="0">
+                <a:solidFill>
+                  <a:srgbClr val="000000"/>
+                </a:solidFill>
+                <a:latin typeface="Cascadia Mono" panose="020B0609020000020004" pitchFamily="49" charset="0"/>
+              </a:rPr>
+              <a:t> </a:t>
+            </a:r>
+            <a:r>
+              <a:rPr lang="en-US" sz="1800" dirty="0">
+                <a:solidFill>
+                  <a:srgbClr val="2B91AF"/>
+                </a:solidFill>
+                <a:latin typeface="Cascadia Mono" panose="020B0609020000020004" pitchFamily="49" charset="0"/>
+              </a:rPr>
+              <a:t>C24BitBMPpixel</a:t>
+            </a:r>
+            <a:r>
+              <a:rPr lang="en-US" sz="1800" dirty="0">
+                <a:solidFill>
+                  <a:srgbClr val="000000"/>
+                </a:solidFill>
+                <a:latin typeface="Cascadia Mono" panose="020B0609020000020004" pitchFamily="49" charset="0"/>
+              </a:rPr>
+              <a:t>[</a:t>
+            </a:r>
+            <a:r>
+              <a:rPr lang="en-US" sz="1800" dirty="0">
+                <a:solidFill>
+                  <a:srgbClr val="0000FF"/>
+                </a:solidFill>
+                <a:latin typeface="Cascadia Mono" panose="020B0609020000020004" pitchFamily="49" charset="0"/>
+              </a:rPr>
+              <a:t>this</a:t>
+            </a:r>
+            <a:r>
+              <a:rPr lang="en-US" sz="1800" dirty="0">
+                <a:solidFill>
+                  <a:srgbClr val="000000"/>
+                </a:solidFill>
+                <a:latin typeface="Cascadia Mono" panose="020B0609020000020004" pitchFamily="49" charset="0"/>
+              </a:rPr>
+              <a:t>-&gt;</a:t>
+            </a:r>
+            <a:r>
+              <a:rPr lang="en-US" sz="1800" dirty="0" err="1">
+                <a:solidFill>
+                  <a:srgbClr val="000000"/>
+                </a:solidFill>
+                <a:latin typeface="Cascadia Mono" panose="020B0609020000020004" pitchFamily="49" charset="0"/>
+              </a:rPr>
+              <a:t>m_numberOfColumns</a:t>
+            </a:r>
+            <a:r>
+              <a:rPr lang="en-US" sz="1800" dirty="0">
+                <a:solidFill>
+                  <a:srgbClr val="000000"/>
+                </a:solidFill>
+                <a:latin typeface="Cascadia Mono" panose="020B0609020000020004" pitchFamily="49" charset="0"/>
+              </a:rPr>
+              <a:t> * </a:t>
+            </a:r>
+            <a:r>
+              <a:rPr lang="en-US" sz="1800" dirty="0">
+                <a:solidFill>
+                  <a:srgbClr val="0000FF"/>
+                </a:solidFill>
+                <a:latin typeface="Cascadia Mono" panose="020B0609020000020004" pitchFamily="49" charset="0"/>
+              </a:rPr>
+              <a:t>this</a:t>
+            </a:r>
+            <a:r>
+              <a:rPr lang="en-US" sz="1800" dirty="0">
+                <a:solidFill>
+                  <a:srgbClr val="000000"/>
+                </a:solidFill>
+                <a:latin typeface="Cascadia Mono" panose="020B0609020000020004" pitchFamily="49" charset="0"/>
+              </a:rPr>
+              <a:t>-&gt;</a:t>
+            </a:r>
+            <a:r>
+              <a:rPr lang="en-US" sz="1800" dirty="0" err="1">
+                <a:solidFill>
+                  <a:srgbClr val="000000"/>
+                </a:solidFill>
+                <a:latin typeface="Cascadia Mono" panose="020B0609020000020004" pitchFamily="49" charset="0"/>
+              </a:rPr>
+              <a:t>m_numberOfRows</a:t>
+            </a:r>
+            <a:r>
+              <a:rPr lang="en-US" sz="1800" dirty="0">
+                <a:solidFill>
+                  <a:srgbClr val="000000"/>
+                </a:solidFill>
+                <a:latin typeface="Cascadia Mono" panose="020B0609020000020004" pitchFamily="49" charset="0"/>
+              </a:rPr>
+              <a:t>];</a:t>
+            </a:r>
+          </a:p>
+          <a:p>
+            <a:r>
+              <a:rPr lang="en-CA" sz="1800" dirty="0"/>
+              <a:t>Allocates a 1D array of three bytes, with a stride of 3 bytes per index.</a:t>
+            </a:r>
+          </a:p>
+          <a:p>
+            <a:endParaRPr lang="en-US" sz="1800" dirty="0">
+              <a:solidFill>
+                <a:srgbClr val="000000"/>
+              </a:solidFill>
+              <a:latin typeface="Cascadia Mono" panose="020B0609020000020004" pitchFamily="49" charset="0"/>
+            </a:endParaRPr>
+          </a:p>
+          <a:p>
+            <a:endParaRPr lang="en-CA" dirty="0"/>
+          </a:p>
+        </p:txBody>
+      </p:sp>
+    </p:spTree>
+    <p:extLst>
+      <p:ext uri="{BB962C8B-B14F-4D97-AF65-F5344CB8AC3E}">
+        <p14:creationId xmlns:p14="http://schemas.microsoft.com/office/powerpoint/2010/main" val="584853662"/>
+      </p:ext>
+    </p:extLst>
+  </p:cSld>
+  <p:clrMapOvr>
+    <a:masterClrMapping/>
+  </p:clrMapOvr>
+</p:sld>
+</file>
+
+<file path=ppt/slides/slide21.xml><?xml version="1.0" encoding="utf-8"?>
+<p:sld xmlns:a="http://schemas.openxmlformats.org/drawingml/2006/main" xmlns:r="http://schemas.openxmlformats.org/officeDocument/2006/relationships" xmlns:p="http://schemas.openxmlformats.org/presentationml/2006/main">
+  <p:cSld>
+    <p:spTree>
+      <p:nvGrpSpPr>
+        <p:cNvPr id="1" name=""/>
+        <p:cNvGrpSpPr/>
+        <p:nvPr/>
+      </p:nvGrpSpPr>
+      <p:grpSpPr>
+        <a:xfrm>
+          <a:off x="0" y="0"/>
+          <a:ext cx="0" cy="0"/>
+          <a:chOff x="0" y="0"/>
+          <a:chExt cx="0" cy="0"/>
+        </a:xfrm>
+      </p:grpSpPr>
+      <p:sp>
+        <p:nvSpPr>
+          <p:cNvPr id="2" name="Title 1">
+            <a:extLst>
+              <a:ext uri="{FF2B5EF4-FFF2-40B4-BE49-F238E27FC236}">
+                <a16:creationId xmlns:a16="http://schemas.microsoft.com/office/drawing/2014/main" id="{EAEACA72-A057-0FFF-63AD-F586A212CFBD}"/>
+              </a:ext>
+            </a:extLst>
+          </p:cNvPr>
+          <p:cNvSpPr>
+            <a:spLocks noGrp="1"/>
+          </p:cNvSpPr>
+          <p:nvPr>
+            <p:ph type="title"/>
+          </p:nvPr>
+        </p:nvSpPr>
+        <p:spPr/>
+        <p:txBody>
+          <a:bodyPr/>
+          <a:lstStyle/>
+          <a:p>
+            <a:r>
+              <a:rPr lang="en-CA" dirty="0"/>
+              <a:t>Getting data into and out of the compute</a:t>
+            </a:r>
+          </a:p>
+        </p:txBody>
+      </p:sp>
+      <p:sp>
+        <p:nvSpPr>
+          <p:cNvPr id="3" name="Content Placeholder 2">
+            <a:extLst>
+              <a:ext uri="{FF2B5EF4-FFF2-40B4-BE49-F238E27FC236}">
+                <a16:creationId xmlns:a16="http://schemas.microsoft.com/office/drawing/2014/main" id="{287F3E45-D655-042F-6E8C-32F172A0845D}"/>
+              </a:ext>
+            </a:extLst>
+          </p:cNvPr>
+          <p:cNvSpPr>
+            <a:spLocks noGrp="1"/>
+          </p:cNvSpPr>
+          <p:nvPr>
+            <p:ph idx="1"/>
+          </p:nvPr>
+        </p:nvSpPr>
+        <p:spPr/>
+        <p:txBody>
+          <a:bodyPr>
+            <a:normAutofit/>
+          </a:bodyPr>
+          <a:lstStyle/>
+          <a:p>
+            <a:r>
+              <a:rPr lang="en-US" sz="1800" dirty="0">
+                <a:solidFill>
+                  <a:srgbClr val="0000FF"/>
+                </a:solidFill>
+                <a:latin typeface="Cascadia Mono" panose="020B0609020000020004" pitchFamily="49" charset="0"/>
+              </a:rPr>
+              <a:t>Assuming this</a:t>
+            </a:r>
+            <a:r>
+              <a:rPr lang="en-US" sz="1800" dirty="0">
+                <a:solidFill>
+                  <a:srgbClr val="000000"/>
+                </a:solidFill>
+                <a:latin typeface="Cascadia Mono" panose="020B0609020000020004" pitchFamily="49" charset="0"/>
+              </a:rPr>
+              <a:t>-&gt;</a:t>
+            </a:r>
+            <a:r>
+              <a:rPr lang="en-US" sz="1800" dirty="0" err="1">
+                <a:solidFill>
+                  <a:srgbClr val="000000"/>
+                </a:solidFill>
+                <a:latin typeface="Cascadia Mono" panose="020B0609020000020004" pitchFamily="49" charset="0"/>
+              </a:rPr>
+              <a:t>m_p_theImages</a:t>
+            </a:r>
+            <a:r>
+              <a:rPr lang="en-US" sz="1800" dirty="0">
+                <a:solidFill>
+                  <a:srgbClr val="000000"/>
+                </a:solidFill>
+                <a:latin typeface="Cascadia Mono" panose="020B0609020000020004" pitchFamily="49" charset="0"/>
+              </a:rPr>
+              <a:t> is this array (RGB, 8 bits each)</a:t>
+            </a:r>
+          </a:p>
+          <a:p>
+            <a:r>
+              <a:rPr lang="en-CA" sz="1800" dirty="0"/>
+              <a:t>Around line 99 we see this: </a:t>
+            </a:r>
+          </a:p>
+          <a:p>
+            <a:r>
+              <a:rPr lang="en-US" sz="1800" dirty="0" err="1">
+                <a:solidFill>
+                  <a:srgbClr val="6F008A"/>
+                </a:solidFill>
+                <a:latin typeface="Cascadia Mono" panose="020B0609020000020004" pitchFamily="49" charset="0"/>
+              </a:rPr>
+              <a:t>glGenTextures</a:t>
+            </a:r>
+            <a:r>
+              <a:rPr lang="en-US" sz="1800" dirty="0">
+                <a:solidFill>
+                  <a:srgbClr val="000000"/>
+                </a:solidFill>
+                <a:latin typeface="Cascadia Mono" panose="020B0609020000020004" pitchFamily="49" charset="0"/>
+              </a:rPr>
+              <a:t>( 1, &amp;(</a:t>
+            </a:r>
+            <a:r>
+              <a:rPr lang="en-US" sz="1800" dirty="0">
+                <a:solidFill>
+                  <a:srgbClr val="0000FF"/>
+                </a:solidFill>
+                <a:latin typeface="Cascadia Mono" panose="020B0609020000020004" pitchFamily="49" charset="0"/>
+              </a:rPr>
+              <a:t>this</a:t>
+            </a:r>
+            <a:r>
+              <a:rPr lang="en-US" sz="1800" dirty="0">
+                <a:solidFill>
+                  <a:srgbClr val="000000"/>
+                </a:solidFill>
+                <a:latin typeface="Cascadia Mono" panose="020B0609020000020004" pitchFamily="49" charset="0"/>
+              </a:rPr>
+              <a:t>-&gt;</a:t>
+            </a:r>
+            <a:r>
+              <a:rPr lang="en-US" sz="1800" dirty="0" err="1">
+                <a:solidFill>
+                  <a:srgbClr val="000000"/>
+                </a:solidFill>
+                <a:latin typeface="Cascadia Mono" panose="020B0609020000020004" pitchFamily="49" charset="0"/>
+              </a:rPr>
+              <a:t>m_textureNumber</a:t>
+            </a:r>
+            <a:r>
+              <a:rPr lang="en-US" sz="1800" dirty="0">
+                <a:solidFill>
+                  <a:srgbClr val="000000"/>
+                </a:solidFill>
+                <a:latin typeface="Cascadia Mono" panose="020B0609020000020004" pitchFamily="49" charset="0"/>
+              </a:rPr>
+              <a:t>) );</a:t>
+            </a:r>
+          </a:p>
+          <a:p>
+            <a:r>
+              <a:rPr lang="en-US" sz="1800" dirty="0" err="1">
+                <a:solidFill>
+                  <a:srgbClr val="6F008A"/>
+                </a:solidFill>
+                <a:latin typeface="Cascadia Mono" panose="020B0609020000020004" pitchFamily="49" charset="0"/>
+              </a:rPr>
+              <a:t>glBindTexture</a:t>
+            </a:r>
+            <a:r>
+              <a:rPr lang="en-US" sz="1800" dirty="0">
+                <a:solidFill>
+                  <a:srgbClr val="000000"/>
+                </a:solidFill>
+                <a:latin typeface="Cascadia Mono" panose="020B0609020000020004" pitchFamily="49" charset="0"/>
+              </a:rPr>
+              <a:t>(</a:t>
+            </a:r>
+            <a:r>
+              <a:rPr lang="en-US" sz="1800" dirty="0">
+                <a:solidFill>
+                  <a:srgbClr val="6F008A"/>
+                </a:solidFill>
+                <a:latin typeface="Cascadia Mono" panose="020B0609020000020004" pitchFamily="49" charset="0"/>
+              </a:rPr>
+              <a:t>GL_TEXTURE_2D</a:t>
+            </a:r>
+            <a:r>
+              <a:rPr lang="en-US" sz="1800" dirty="0">
+                <a:solidFill>
+                  <a:srgbClr val="000000"/>
+                </a:solidFill>
+                <a:latin typeface="Cascadia Mono" panose="020B0609020000020004" pitchFamily="49" charset="0"/>
+              </a:rPr>
+              <a:t>, </a:t>
+            </a:r>
+            <a:r>
+              <a:rPr lang="en-US" sz="1800" dirty="0">
+                <a:solidFill>
+                  <a:srgbClr val="0000FF"/>
+                </a:solidFill>
+                <a:latin typeface="Cascadia Mono" panose="020B0609020000020004" pitchFamily="49" charset="0"/>
+              </a:rPr>
+              <a:t>this</a:t>
+            </a:r>
+            <a:r>
+              <a:rPr lang="en-US" sz="1800" dirty="0">
+                <a:solidFill>
+                  <a:srgbClr val="000000"/>
+                </a:solidFill>
+                <a:latin typeface="Cascadia Mono" panose="020B0609020000020004" pitchFamily="49" charset="0"/>
+              </a:rPr>
+              <a:t>-&gt;</a:t>
+            </a:r>
+            <a:r>
+              <a:rPr lang="en-US" sz="1800" dirty="0" err="1">
+                <a:solidFill>
+                  <a:srgbClr val="000000"/>
+                </a:solidFill>
+                <a:latin typeface="Cascadia Mono" panose="020B0609020000020004" pitchFamily="49" charset="0"/>
+              </a:rPr>
+              <a:t>m_textureNumber</a:t>
+            </a:r>
+            <a:r>
+              <a:rPr lang="en-US" sz="1800" dirty="0">
+                <a:solidFill>
+                  <a:srgbClr val="000000"/>
+                </a:solidFill>
+                <a:latin typeface="Cascadia Mono" panose="020B0609020000020004" pitchFamily="49" charset="0"/>
+              </a:rPr>
+              <a:t>);</a:t>
+            </a:r>
+          </a:p>
+          <a:p>
+            <a:r>
+              <a:rPr lang="en-US" sz="1800" dirty="0">
+                <a:solidFill>
+                  <a:srgbClr val="6F008A"/>
+                </a:solidFill>
+                <a:latin typeface="Cascadia Mono" panose="020B0609020000020004" pitchFamily="49" charset="0"/>
+              </a:rPr>
+              <a:t>glTexImage2D</a:t>
+            </a:r>
+            <a:r>
+              <a:rPr lang="en-US" sz="1800" dirty="0">
+                <a:solidFill>
+                  <a:srgbClr val="000000"/>
+                </a:solidFill>
+                <a:latin typeface="Cascadia Mono" panose="020B0609020000020004" pitchFamily="49" charset="0"/>
+              </a:rPr>
+              <a:t>( </a:t>
+            </a:r>
+            <a:r>
+              <a:rPr lang="en-US" sz="1800" dirty="0">
+                <a:solidFill>
+                  <a:srgbClr val="6F008A"/>
+                </a:solidFill>
+                <a:latin typeface="Cascadia Mono" panose="020B0609020000020004" pitchFamily="49" charset="0"/>
+              </a:rPr>
+              <a:t>GL_TEXTURE_2D</a:t>
+            </a:r>
+            <a:r>
+              <a:rPr lang="en-US" sz="1800" dirty="0">
+                <a:solidFill>
+                  <a:srgbClr val="000000"/>
+                </a:solidFill>
+                <a:latin typeface="Cascadia Mono" panose="020B0609020000020004" pitchFamily="49" charset="0"/>
+              </a:rPr>
+              <a:t>,</a:t>
+            </a:r>
+            <a:r>
+              <a:rPr lang="en-US" sz="1800" dirty="0">
+                <a:solidFill>
+                  <a:srgbClr val="008000"/>
+                </a:solidFill>
+                <a:latin typeface="Cascadia Mono" panose="020B0609020000020004" pitchFamily="49" charset="0"/>
+              </a:rPr>
+              <a:t>// target (2D, 3D, </a:t>
+            </a:r>
+            <a:r>
+              <a:rPr lang="en-US" sz="1800" dirty="0" err="1">
+                <a:solidFill>
+                  <a:srgbClr val="008000"/>
+                </a:solidFill>
+                <a:latin typeface="Cascadia Mono" panose="020B0609020000020004" pitchFamily="49" charset="0"/>
+              </a:rPr>
+              <a:t>etc</a:t>
+            </a:r>
+            <a:r>
+              <a:rPr lang="en-CA" sz="1800" dirty="0">
+                <a:solidFill>
+                  <a:srgbClr val="000000"/>
+                </a:solidFill>
+                <a:latin typeface="Cascadia Mono" panose="020B0609020000020004" pitchFamily="49" charset="0"/>
+              </a:rPr>
+              <a:t> 0,</a:t>
+            </a:r>
+            <a:r>
+              <a:rPr lang="en-CA" sz="1800" dirty="0">
+                <a:solidFill>
+                  <a:srgbClr val="008000"/>
+                </a:solidFill>
+                <a:latin typeface="Cascadia Mono" panose="020B0609020000020004" pitchFamily="49" charset="0"/>
+              </a:rPr>
+              <a:t>// MIP map level</a:t>
+            </a:r>
+            <a:br>
+              <a:rPr lang="en-CA" sz="1800" dirty="0">
+                <a:solidFill>
+                  <a:srgbClr val="008000"/>
+                </a:solidFill>
+                <a:latin typeface="Cascadia Mono" panose="020B0609020000020004" pitchFamily="49" charset="0"/>
+              </a:rPr>
+            </a:br>
+            <a:r>
+              <a:rPr lang="en-CA" sz="1800" dirty="0">
+                <a:solidFill>
+                  <a:srgbClr val="008000"/>
+                </a:solidFill>
+                <a:latin typeface="Cascadia Mono" panose="020B0609020000020004" pitchFamily="49" charset="0"/>
+              </a:rPr>
+              <a:t>	</a:t>
+            </a:r>
+            <a:r>
+              <a:rPr lang="en-CA" sz="1800" dirty="0">
+                <a:solidFill>
+                  <a:srgbClr val="6F008A"/>
+                </a:solidFill>
+                <a:latin typeface="Cascadia Mono" panose="020B0609020000020004" pitchFamily="49" charset="0"/>
+              </a:rPr>
+              <a:t>GL_RGBA</a:t>
+            </a:r>
+            <a:r>
+              <a:rPr lang="en-CA" sz="1800" dirty="0">
+                <a:solidFill>
+                  <a:srgbClr val="000000"/>
+                </a:solidFill>
+                <a:latin typeface="Cascadia Mono" panose="020B0609020000020004" pitchFamily="49" charset="0"/>
+              </a:rPr>
+              <a:t>,</a:t>
+            </a:r>
+            <a:r>
+              <a:rPr lang="en-CA" sz="1800" dirty="0">
+                <a:solidFill>
+                  <a:srgbClr val="008000"/>
+                </a:solidFill>
+                <a:latin typeface="Cascadia Mono" panose="020B0609020000020004" pitchFamily="49" charset="0"/>
+              </a:rPr>
+              <a:t>// internal format i.e. in the GPU</a:t>
+            </a:r>
+            <a:br>
+              <a:rPr lang="en-CA" sz="1800" dirty="0">
+                <a:solidFill>
+                  <a:srgbClr val="000000"/>
+                </a:solidFill>
+                <a:latin typeface="Cascadia Mono" panose="020B0609020000020004" pitchFamily="49" charset="0"/>
+              </a:rPr>
+            </a:br>
+            <a:r>
+              <a:rPr lang="en-CA" sz="1800" dirty="0">
+                <a:solidFill>
+                  <a:srgbClr val="000000"/>
+                </a:solidFill>
+                <a:latin typeface="Cascadia Mono" panose="020B0609020000020004" pitchFamily="49" charset="0"/>
+              </a:rPr>
+              <a:t>	</a:t>
+            </a:r>
+            <a:r>
+              <a:rPr lang="en-US" sz="1800" dirty="0">
+                <a:solidFill>
+                  <a:srgbClr val="0000FF"/>
+                </a:solidFill>
+                <a:latin typeface="Cascadia Mono" panose="020B0609020000020004" pitchFamily="49" charset="0"/>
+              </a:rPr>
+              <a:t>this</a:t>
+            </a:r>
+            <a:r>
+              <a:rPr lang="en-US" sz="1800" dirty="0">
+                <a:solidFill>
+                  <a:srgbClr val="000000"/>
+                </a:solidFill>
+                <a:latin typeface="Cascadia Mono" panose="020B0609020000020004" pitchFamily="49" charset="0"/>
+              </a:rPr>
+              <a:t>-&gt;</a:t>
+            </a:r>
+            <a:r>
+              <a:rPr lang="en-US" sz="1800" dirty="0" err="1">
+                <a:solidFill>
+                  <a:srgbClr val="000000"/>
+                </a:solidFill>
+                <a:latin typeface="Cascadia Mono" panose="020B0609020000020004" pitchFamily="49" charset="0"/>
+              </a:rPr>
+              <a:t>m_numberOfColumns</a:t>
+            </a:r>
+            <a:r>
+              <a:rPr lang="en-US" sz="1800" dirty="0">
+                <a:solidFill>
+                  <a:srgbClr val="000000"/>
+                </a:solidFill>
+                <a:latin typeface="Cascadia Mono" panose="020B0609020000020004" pitchFamily="49" charset="0"/>
+              </a:rPr>
+              <a:t>,</a:t>
+            </a:r>
+            <a:r>
+              <a:rPr lang="en-US" sz="1800" dirty="0">
+                <a:solidFill>
+                  <a:srgbClr val="008000"/>
+                </a:solidFill>
+                <a:latin typeface="Cascadia Mono" panose="020B0609020000020004" pitchFamily="49" charset="0"/>
+              </a:rPr>
+              <a:t>// width (pixels)</a:t>
+            </a:r>
+            <a:br>
+              <a:rPr lang="en-US" sz="1800" dirty="0">
+                <a:solidFill>
+                  <a:srgbClr val="000000"/>
+                </a:solidFill>
+                <a:latin typeface="Cascadia Mono" panose="020B0609020000020004" pitchFamily="49" charset="0"/>
+              </a:rPr>
+            </a:br>
+            <a:r>
+              <a:rPr lang="en-US" sz="1800" dirty="0">
+                <a:solidFill>
+                  <a:srgbClr val="000000"/>
+                </a:solidFill>
+                <a:latin typeface="Cascadia Mono" panose="020B0609020000020004" pitchFamily="49" charset="0"/>
+              </a:rPr>
+              <a:t>	</a:t>
+            </a:r>
+            <a:r>
+              <a:rPr lang="en-US" sz="1800" dirty="0">
+                <a:solidFill>
+                  <a:srgbClr val="0000FF"/>
+                </a:solidFill>
+                <a:latin typeface="Cascadia Mono" panose="020B0609020000020004" pitchFamily="49" charset="0"/>
+              </a:rPr>
+              <a:t>this</a:t>
+            </a:r>
+            <a:r>
+              <a:rPr lang="en-US" sz="1800" dirty="0">
+                <a:solidFill>
+                  <a:srgbClr val="000000"/>
+                </a:solidFill>
+                <a:latin typeface="Cascadia Mono" panose="020B0609020000020004" pitchFamily="49" charset="0"/>
+              </a:rPr>
+              <a:t>-&gt;</a:t>
+            </a:r>
+            <a:r>
+              <a:rPr lang="en-US" sz="1800" dirty="0" err="1">
+                <a:solidFill>
+                  <a:srgbClr val="000000"/>
+                </a:solidFill>
+                <a:latin typeface="Cascadia Mono" panose="020B0609020000020004" pitchFamily="49" charset="0"/>
+              </a:rPr>
+              <a:t>m_numberOfRows</a:t>
+            </a:r>
+            <a:r>
+              <a:rPr lang="en-US" sz="1800" dirty="0">
+                <a:solidFill>
+                  <a:srgbClr val="000000"/>
+                </a:solidFill>
+                <a:latin typeface="Cascadia Mono" panose="020B0609020000020004" pitchFamily="49" charset="0"/>
+              </a:rPr>
+              <a:t>,</a:t>
+            </a:r>
+            <a:r>
+              <a:rPr lang="en-US" sz="1800" dirty="0">
+                <a:solidFill>
+                  <a:srgbClr val="008000"/>
+                </a:solidFill>
+                <a:latin typeface="Cascadia Mono" panose="020B0609020000020004" pitchFamily="49" charset="0"/>
+              </a:rPr>
+              <a:t>// height (pixels)</a:t>
+            </a:r>
+            <a:br>
+              <a:rPr lang="en-US" sz="1800" dirty="0">
+                <a:solidFill>
+                  <a:srgbClr val="000000"/>
+                </a:solidFill>
+                <a:latin typeface="Cascadia Mono" panose="020B0609020000020004" pitchFamily="49" charset="0"/>
+              </a:rPr>
+            </a:br>
+            <a:r>
+              <a:rPr lang="en-US" sz="1800" dirty="0">
+                <a:solidFill>
+                  <a:srgbClr val="000000"/>
+                </a:solidFill>
+                <a:latin typeface="Cascadia Mono" panose="020B0609020000020004" pitchFamily="49" charset="0"/>
+              </a:rPr>
+              <a:t>	0,</a:t>
+            </a:r>
+            <a:r>
+              <a:rPr lang="en-US" sz="1800" dirty="0">
+                <a:solidFill>
+                  <a:srgbClr val="008000"/>
+                </a:solidFill>
+                <a:latin typeface="Cascadia Mono" panose="020B0609020000020004" pitchFamily="49" charset="0"/>
+              </a:rPr>
+              <a:t>// border (0 or 1)</a:t>
+            </a:r>
+            <a:br>
+              <a:rPr lang="en-US" sz="1800" dirty="0">
+                <a:solidFill>
+                  <a:srgbClr val="000000"/>
+                </a:solidFill>
+                <a:latin typeface="Cascadia Mono" panose="020B0609020000020004" pitchFamily="49" charset="0"/>
+              </a:rPr>
+            </a:br>
+            <a:r>
+              <a:rPr lang="en-US" sz="1800" dirty="0">
+                <a:solidFill>
+                  <a:srgbClr val="000000"/>
+                </a:solidFill>
+                <a:latin typeface="Cascadia Mono" panose="020B0609020000020004" pitchFamily="49" charset="0"/>
+              </a:rPr>
+              <a:t>	</a:t>
+            </a:r>
+            <a:r>
+              <a:rPr lang="en-US" sz="1800" dirty="0">
+                <a:solidFill>
+                  <a:srgbClr val="6F008A"/>
+                </a:solidFill>
+                <a:latin typeface="Cascadia Mono" panose="020B0609020000020004" pitchFamily="49" charset="0"/>
+              </a:rPr>
+              <a:t>GL_RGB</a:t>
+            </a:r>
+            <a:r>
+              <a:rPr lang="en-US" sz="1800" dirty="0">
+                <a:solidFill>
+                  <a:srgbClr val="000000"/>
+                </a:solidFill>
+                <a:latin typeface="Cascadia Mono" panose="020B0609020000020004" pitchFamily="49" charset="0"/>
+              </a:rPr>
+              <a:t>,</a:t>
+            </a:r>
+            <a:r>
+              <a:rPr lang="en-US" sz="1800" dirty="0">
+                <a:solidFill>
+                  <a:srgbClr val="008000"/>
+                </a:solidFill>
+                <a:latin typeface="Cascadia Mono" panose="020B0609020000020004" pitchFamily="49" charset="0"/>
+              </a:rPr>
+              <a:t>// format of pixel data </a:t>
+            </a:r>
+            <a:r>
+              <a:rPr lang="en-US" sz="1800" dirty="0">
+                <a:solidFill>
+                  <a:srgbClr val="008000"/>
+                </a:solidFill>
+                <a:latin typeface="Cascadia Mono" panose="020B0609020000020004" pitchFamily="49" charset="0"/>
+                <a:sym typeface="Wingdings" panose="05000000000000000000" pitchFamily="2" charset="2"/>
+              </a:rPr>
+              <a:t> that the GPU is being given</a:t>
+            </a:r>
+            <a:br>
+              <a:rPr lang="en-US" sz="1800" dirty="0">
+                <a:solidFill>
+                  <a:srgbClr val="000000"/>
+                </a:solidFill>
+                <a:latin typeface="Cascadia Mono" panose="020B0609020000020004" pitchFamily="49" charset="0"/>
+              </a:rPr>
+            </a:br>
+            <a:r>
+              <a:rPr lang="en-US" sz="1800" dirty="0">
+                <a:solidFill>
+                  <a:srgbClr val="000000"/>
+                </a:solidFill>
+                <a:latin typeface="Cascadia Mono" panose="020B0609020000020004" pitchFamily="49" charset="0"/>
+              </a:rPr>
+              <a:t>	</a:t>
+            </a:r>
+            <a:r>
+              <a:rPr lang="en-US" sz="1800" dirty="0">
+                <a:solidFill>
+                  <a:srgbClr val="6F008A"/>
+                </a:solidFill>
+                <a:latin typeface="Cascadia Mono" panose="020B0609020000020004" pitchFamily="49" charset="0"/>
+              </a:rPr>
+              <a:t>GL_UNSIGNED_BYTE</a:t>
+            </a:r>
+            <a:r>
+              <a:rPr lang="en-US" sz="1800" dirty="0">
+                <a:solidFill>
+                  <a:srgbClr val="000000"/>
+                </a:solidFill>
+                <a:latin typeface="Cascadia Mono" panose="020B0609020000020004" pitchFamily="49" charset="0"/>
+              </a:rPr>
+              <a:t>,</a:t>
+            </a:r>
+            <a:r>
+              <a:rPr lang="en-US" sz="1800" dirty="0">
+                <a:solidFill>
+                  <a:srgbClr val="008000"/>
+                </a:solidFill>
+                <a:latin typeface="Cascadia Mono" panose="020B0609020000020004" pitchFamily="49" charset="0"/>
+              </a:rPr>
+              <a:t>// type of pixel data</a:t>
+            </a:r>
+            <a:br>
+              <a:rPr lang="en-US" sz="1800" dirty="0">
+                <a:solidFill>
+                  <a:srgbClr val="000000"/>
+                </a:solidFill>
+                <a:latin typeface="Cascadia Mono" panose="020B0609020000020004" pitchFamily="49" charset="0"/>
+              </a:rPr>
+            </a:br>
+            <a:r>
+              <a:rPr lang="en-US" sz="1800" dirty="0">
+                <a:solidFill>
+                  <a:srgbClr val="000000"/>
+                </a:solidFill>
+                <a:latin typeface="Cascadia Mono" panose="020B0609020000020004" pitchFamily="49" charset="0"/>
+              </a:rPr>
+              <a:t>	</a:t>
+            </a:r>
+            <a:r>
+              <a:rPr lang="en-US" sz="1800" dirty="0">
+                <a:solidFill>
+                  <a:srgbClr val="0000FF"/>
+                </a:solidFill>
+                <a:latin typeface="Cascadia Mono" panose="020B0609020000020004" pitchFamily="49" charset="0"/>
+              </a:rPr>
+              <a:t>this</a:t>
+            </a:r>
+            <a:r>
+              <a:rPr lang="en-US" sz="1800" dirty="0">
+                <a:solidFill>
+                  <a:srgbClr val="000000"/>
+                </a:solidFill>
+                <a:latin typeface="Cascadia Mono" panose="020B0609020000020004" pitchFamily="49" charset="0"/>
+              </a:rPr>
+              <a:t>-&gt;</a:t>
+            </a:r>
+            <a:r>
+              <a:rPr lang="en-US" sz="1800" dirty="0" err="1">
+                <a:solidFill>
+                  <a:srgbClr val="000000"/>
+                </a:solidFill>
+                <a:latin typeface="Cascadia Mono" panose="020B0609020000020004" pitchFamily="49" charset="0"/>
+              </a:rPr>
+              <a:t>m_p_theImages</a:t>
+            </a:r>
+            <a:r>
+              <a:rPr lang="en-US" sz="1800" dirty="0">
+                <a:solidFill>
+                  <a:srgbClr val="000000"/>
+                </a:solidFill>
+                <a:latin typeface="Cascadia Mono" panose="020B0609020000020004" pitchFamily="49" charset="0"/>
+              </a:rPr>
+              <a:t>);</a:t>
+            </a:r>
+            <a:r>
+              <a:rPr lang="en-US" sz="1800" dirty="0">
+                <a:solidFill>
+                  <a:srgbClr val="008000"/>
+                </a:solidFill>
+                <a:latin typeface="Cascadia Mono" panose="020B0609020000020004" pitchFamily="49" charset="0"/>
+              </a:rPr>
+              <a:t>// pointer to data in memory</a:t>
+            </a:r>
+            <a:endParaRPr lang="en-US" sz="1800" dirty="0">
+              <a:solidFill>
+                <a:srgbClr val="000000"/>
+              </a:solidFill>
+              <a:latin typeface="Cascadia Mono" panose="020B0609020000020004" pitchFamily="49" charset="0"/>
+            </a:endParaRPr>
+          </a:p>
+          <a:p>
+            <a:r>
+              <a:rPr lang="en-CA" sz="1800" dirty="0">
+                <a:hlinkClick r:id="rId2"/>
+              </a:rPr>
+              <a:t>https://registry.khronos.org/OpenGL-Refpages/gl4/html/glTexImage2D.xhtml</a:t>
+            </a:r>
+            <a:r>
+              <a:rPr lang="en-CA" sz="1800" dirty="0"/>
+              <a:t> </a:t>
+            </a:r>
+          </a:p>
+        </p:txBody>
+      </p:sp>
+    </p:spTree>
+    <p:extLst>
+      <p:ext uri="{BB962C8B-B14F-4D97-AF65-F5344CB8AC3E}">
+        <p14:creationId xmlns:p14="http://schemas.microsoft.com/office/powerpoint/2010/main" val="3648044549"/>
+      </p:ext>
+    </p:extLst>
+  </p:cSld>
+  <p:clrMapOvr>
+    <a:masterClrMapping/>
+  </p:clrMapOvr>
+</p:sld>
+</file>
+
 <file path=ppt/slides/slide3.xml><?xml version="1.0" encoding="utf-8"?>
 <p:sld xmlns:a="http://schemas.openxmlformats.org/drawingml/2006/main" xmlns:r="http://schemas.openxmlformats.org/officeDocument/2006/relationships" xmlns:p="http://schemas.openxmlformats.org/presentationml/2006/main">
   <p:cSld>
@@ -8974,7 +11532,7 @@
         </p:nvSpPr>
         <p:spPr>
           <a:xfrm>
-            <a:off x="1883664" y="1872296"/>
+            <a:off x="1775509" y="1862756"/>
             <a:ext cx="4892040" cy="1979709"/>
           </a:xfrm>
           <a:prstGeom prst="rect">
@@ -11281,8 +13839,8 @@
           </a:xfrm>
           <a:prstGeom prst="cloudCallout">
             <a:avLst>
-              <a:gd name="adj1" fmla="val -36062"/>
-              <a:gd name="adj2" fmla="val 66675"/>
+              <a:gd name="adj1" fmla="val -37077"/>
+              <a:gd name="adj2" fmla="val 64784"/>
             </a:avLst>
           </a:prstGeom>
         </p:spPr>

</xml_diff>